<commit_message>
Ipdated the Overview document.
</commit_message>
<xml_diff>
--- a/Overview.pptx
+++ b/Overview.pptx
@@ -6,7 +6,10 @@
   </p:sldMasterIdLst>
   <p:sldIdLst>
     <p:sldId id="256" r:id="rId2"/>
-    <p:sldId id="257" r:id="rId3"/>
+    <p:sldId id="263" r:id="rId3"/>
+    <p:sldId id="257" r:id="rId4"/>
+    <p:sldId id="261" r:id="rId5"/>
+    <p:sldId id="262" r:id="rId6"/>
   </p:sldIdLst>
   <p:sldSz cx="12192000" cy="6858000"/>
   <p:notesSz cx="6858000" cy="9144000"/>
@@ -105,6 +108,11 @@
       </a:defRPr>
     </a:lvl9pPr>
   </p:defaultTextStyle>
+  <p:extLst>
+    <p:ext uri="{EFAFB233-063F-42B5-8137-9DF3F51BA10A}">
+      <p15:sldGuideLst xmlns:p15="http://schemas.microsoft.com/office/powerpoint/2012/main"/>
+    </p:ext>
+  </p:extLst>
 </p:presentation>
 </file>
 
@@ -255,7 +263,7 @@
           <a:p>
             <a:fld id="{1A4BFEFF-3F0A-4297-B0D7-462D4925B3E2}" type="datetimeFigureOut">
               <a:rPr lang="es-ES" smtClean="0"/>
-              <a:t>01/09/2023</a:t>
+              <a:t>02/09/2023</a:t>
             </a:fld>
             <a:endParaRPr lang="es-ES"/>
           </a:p>
@@ -453,7 +461,7 @@
           <a:p>
             <a:fld id="{1A4BFEFF-3F0A-4297-B0D7-462D4925B3E2}" type="datetimeFigureOut">
               <a:rPr lang="es-ES" smtClean="0"/>
-              <a:t>01/09/2023</a:t>
+              <a:t>02/09/2023</a:t>
             </a:fld>
             <a:endParaRPr lang="es-ES"/>
           </a:p>
@@ -661,7 +669,7 @@
           <a:p>
             <a:fld id="{1A4BFEFF-3F0A-4297-B0D7-462D4925B3E2}" type="datetimeFigureOut">
               <a:rPr lang="es-ES" smtClean="0"/>
-              <a:t>01/09/2023</a:t>
+              <a:t>02/09/2023</a:t>
             </a:fld>
             <a:endParaRPr lang="es-ES"/>
           </a:p>
@@ -859,7 +867,7 @@
           <a:p>
             <a:fld id="{1A4BFEFF-3F0A-4297-B0D7-462D4925B3E2}" type="datetimeFigureOut">
               <a:rPr lang="es-ES" smtClean="0"/>
-              <a:t>01/09/2023</a:t>
+              <a:t>02/09/2023</a:t>
             </a:fld>
             <a:endParaRPr lang="es-ES"/>
           </a:p>
@@ -1134,7 +1142,7 @@
           <a:p>
             <a:fld id="{1A4BFEFF-3F0A-4297-B0D7-462D4925B3E2}" type="datetimeFigureOut">
               <a:rPr lang="es-ES" smtClean="0"/>
-              <a:t>01/09/2023</a:t>
+              <a:t>02/09/2023</a:t>
             </a:fld>
             <a:endParaRPr lang="es-ES"/>
           </a:p>
@@ -1399,7 +1407,7 @@
           <a:p>
             <a:fld id="{1A4BFEFF-3F0A-4297-B0D7-462D4925B3E2}" type="datetimeFigureOut">
               <a:rPr lang="es-ES" smtClean="0"/>
-              <a:t>01/09/2023</a:t>
+              <a:t>02/09/2023</a:t>
             </a:fld>
             <a:endParaRPr lang="es-ES"/>
           </a:p>
@@ -1811,7 +1819,7 @@
           <a:p>
             <a:fld id="{1A4BFEFF-3F0A-4297-B0D7-462D4925B3E2}" type="datetimeFigureOut">
               <a:rPr lang="es-ES" smtClean="0"/>
-              <a:t>01/09/2023</a:t>
+              <a:t>02/09/2023</a:t>
             </a:fld>
             <a:endParaRPr lang="es-ES"/>
           </a:p>
@@ -1952,7 +1960,7 @@
           <a:p>
             <a:fld id="{1A4BFEFF-3F0A-4297-B0D7-462D4925B3E2}" type="datetimeFigureOut">
               <a:rPr lang="es-ES" smtClean="0"/>
-              <a:t>01/09/2023</a:t>
+              <a:t>02/09/2023</a:t>
             </a:fld>
             <a:endParaRPr lang="es-ES"/>
           </a:p>
@@ -2065,7 +2073,7 @@
           <a:p>
             <a:fld id="{1A4BFEFF-3F0A-4297-B0D7-462D4925B3E2}" type="datetimeFigureOut">
               <a:rPr lang="es-ES" smtClean="0"/>
-              <a:t>01/09/2023</a:t>
+              <a:t>02/09/2023</a:t>
             </a:fld>
             <a:endParaRPr lang="es-ES"/>
           </a:p>
@@ -2376,7 +2384,7 @@
           <a:p>
             <a:fld id="{1A4BFEFF-3F0A-4297-B0D7-462D4925B3E2}" type="datetimeFigureOut">
               <a:rPr lang="es-ES" smtClean="0"/>
-              <a:t>01/09/2023</a:t>
+              <a:t>02/09/2023</a:t>
             </a:fld>
             <a:endParaRPr lang="es-ES"/>
           </a:p>
@@ -2664,7 +2672,7 @@
           <a:p>
             <a:fld id="{1A4BFEFF-3F0A-4297-B0D7-462D4925B3E2}" type="datetimeFigureOut">
               <a:rPr lang="es-ES" smtClean="0"/>
-              <a:t>01/09/2023</a:t>
+              <a:t>02/09/2023</a:t>
             </a:fld>
             <a:endParaRPr lang="es-ES"/>
           </a:p>
@@ -2911,7 +2919,7 @@
           <a:p>
             <a:fld id="{1A4BFEFF-3F0A-4297-B0D7-462D4925B3E2}" type="datetimeFigureOut">
               <a:rPr lang="es-ES" smtClean="0"/>
-              <a:t>01/09/2023</a:t>
+              <a:t>02/09/2023</a:t>
             </a:fld>
             <a:endParaRPr lang="es-ES"/>
           </a:p>
@@ -3330,10 +3338,10 @@
       </p:grpSpPr>
       <p:sp>
         <p:nvSpPr>
-          <p:cNvPr id="27" name="Rectángulo 26">
-            <a:extLst>
-              <a:ext uri="{FF2B5EF4-FFF2-40B4-BE49-F238E27FC236}">
-                <a16:creationId xmlns:a16="http://schemas.microsoft.com/office/drawing/2014/main" id="{EE6C71B7-FB70-74A1-CD22-96854B06E98A}"/>
+          <p:cNvPr id="1066" name="Rectángulo 1065">
+            <a:extLst>
+              <a:ext uri="{FF2B5EF4-FFF2-40B4-BE49-F238E27FC236}">
+                <a16:creationId xmlns:a16="http://schemas.microsoft.com/office/drawing/2014/main" id="{68DD43BE-8FFD-30F9-E7FE-2A22AC03F3B1}"/>
               </a:ext>
             </a:extLst>
           </p:cNvPr>
@@ -3342,8 +3350,8 @@
         </p:nvSpPr>
         <p:spPr>
           <a:xfrm>
-            <a:off x="167946" y="1275869"/>
-            <a:ext cx="1763487" cy="825789"/>
+            <a:off x="7334864" y="3686647"/>
+            <a:ext cx="1131339" cy="838272"/>
           </a:xfrm>
           <a:prstGeom prst="rect">
             <a:avLst/>
@@ -3383,59 +3391,61 @@
           </a:p>
         </p:txBody>
       </p:sp>
-      <p:pic>
-        <p:nvPicPr>
-          <p:cNvPr id="1036" name="Picture 12" descr="Sendcloud - eDesk | Faster, smarter customer support software for eCommerce">
-            <a:extLst>
-              <a:ext uri="{FF2B5EF4-FFF2-40B4-BE49-F238E27FC236}">
-                <a16:creationId xmlns:a16="http://schemas.microsoft.com/office/drawing/2014/main" id="{FB26D9F2-3055-01E3-E26C-FEDD69AD080B}"/>
-              </a:ext>
-            </a:extLst>
-          </p:cNvPr>
-          <p:cNvPicPr>
-            <a:picLocks noChangeAspect="1" noChangeArrowheads="1"/>
-          </p:cNvPicPr>
-          <p:nvPr/>
-        </p:nvPicPr>
-        <p:blipFill>
-          <a:blip r:embed="rId2">
-            <a:extLst>
-              <a:ext uri="{28A0092B-C50C-407E-A947-70E740481C1C}">
-                <a14:useLocalDpi xmlns:a14="http://schemas.microsoft.com/office/drawing/2010/main" val="0"/>
-              </a:ext>
-            </a:extLst>
-          </a:blip>
-          <a:srcRect/>
-          <a:stretch>
-            <a:fillRect/>
-          </a:stretch>
-        </p:blipFill>
-        <p:spPr bwMode="auto">
-          <a:xfrm>
-            <a:off x="167946" y="1275870"/>
-            <a:ext cx="1222316" cy="518558"/>
+      <p:sp>
+        <p:nvSpPr>
+          <p:cNvPr id="1067" name="CuadroTexto 1066">
+            <a:extLst>
+              <a:ext uri="{FF2B5EF4-FFF2-40B4-BE49-F238E27FC236}">
+                <a16:creationId xmlns:a16="http://schemas.microsoft.com/office/drawing/2014/main" id="{B5D1F090-ED6E-7515-F8DE-BB59CB9941CC}"/>
+              </a:ext>
+            </a:extLst>
+          </p:cNvPr>
+          <p:cNvSpPr txBox="1"/>
+          <p:nvPr/>
+        </p:nvSpPr>
+        <p:spPr>
+          <a:xfrm>
+            <a:off x="7417352" y="4023819"/>
+            <a:ext cx="1084991" cy="369332"/>
           </a:xfrm>
           <a:prstGeom prst="rect">
             <a:avLst/>
           </a:prstGeom>
           <a:noFill/>
-          <a:extLst>
-            <a:ext uri="{909E8E84-426E-40DD-AFC4-6F175D3DCCD1}">
-              <a14:hiddenFill xmlns:a14="http://schemas.microsoft.com/office/drawing/2010/main">
-                <a:solidFill>
-                  <a:srgbClr val="FFFFFF"/>
-                </a:solidFill>
-              </a14:hiddenFill>
-            </a:ext>
-          </a:extLst>
-        </p:spPr>
-      </p:pic>
-      <p:sp>
-        <p:nvSpPr>
-          <p:cNvPr id="5" name="Rectángulo 4">
-            <a:extLst>
-              <a:ext uri="{FF2B5EF4-FFF2-40B4-BE49-F238E27FC236}">
-                <a16:creationId xmlns:a16="http://schemas.microsoft.com/office/drawing/2014/main" id="{46D190BB-7DAA-7468-96E0-6D7EB560655C}"/>
+        </p:spPr>
+        <p:txBody>
+          <a:bodyPr wrap="square" rtlCol="0">
+            <a:spAutoFit/>
+          </a:bodyPr>
+          <a:lstStyle/>
+          <a:p>
+            <a:r>
+              <a:rPr lang="es-ES" sz="1000" b="1" dirty="0">
+                <a:solidFill>
+                  <a:schemeClr val="bg1"/>
+                </a:solidFill>
+              </a:rPr>
+              <a:t>Sciforma</a:t>
+            </a:r>
+          </a:p>
+          <a:p>
+            <a:r>
+              <a:rPr lang="es-ES" sz="800" dirty="0">
+                <a:solidFill>
+                  <a:srgbClr val="CC99FF"/>
+                </a:solidFill>
+              </a:rPr>
+              <a:t>Click see more</a:t>
+            </a:r>
+          </a:p>
+        </p:txBody>
+      </p:sp>
+      <p:sp>
+        <p:nvSpPr>
+          <p:cNvPr id="1057" name="Rectángulo 1056">
+            <a:extLst>
+              <a:ext uri="{FF2B5EF4-FFF2-40B4-BE49-F238E27FC236}">
+                <a16:creationId xmlns:a16="http://schemas.microsoft.com/office/drawing/2014/main" id="{004686A0-A5C3-F95E-A5C0-F7FBB5D7E58E}"/>
               </a:ext>
             </a:extLst>
           </p:cNvPr>
@@ -3444,8 +3454,8 @@
         </p:nvSpPr>
         <p:spPr>
           <a:xfrm>
-            <a:off x="5176934" y="1263385"/>
-            <a:ext cx="1990531" cy="1828800"/>
+            <a:off x="7328147" y="2739373"/>
+            <a:ext cx="1131339" cy="838272"/>
           </a:xfrm>
           <a:prstGeom prst="rect">
             <a:avLst/>
@@ -3485,184 +3495,12 @@
           </a:p>
         </p:txBody>
       </p:sp>
-      <p:pic>
-        <p:nvPicPr>
-          <p:cNvPr id="1026" name="Picture 2" descr="Sage Group - Wikipedia">
-            <a:extLst>
-              <a:ext uri="{FF2B5EF4-FFF2-40B4-BE49-F238E27FC236}">
-                <a16:creationId xmlns:a16="http://schemas.microsoft.com/office/drawing/2014/main" id="{C62A70CC-B076-808A-8E42-664CF461FF38}"/>
-              </a:ext>
-            </a:extLst>
-          </p:cNvPr>
-          <p:cNvPicPr>
-            <a:picLocks noChangeAspect="1" noChangeArrowheads="1"/>
-          </p:cNvPicPr>
-          <p:nvPr/>
-        </p:nvPicPr>
-        <p:blipFill>
-          <a:blip r:embed="rId3">
-            <a:extLst>
-              <a:ext uri="{28A0092B-C50C-407E-A947-70E740481C1C}">
-                <a14:useLocalDpi xmlns:a14="http://schemas.microsoft.com/office/drawing/2010/main" val="0"/>
-              </a:ext>
-            </a:extLst>
-          </a:blip>
-          <a:srcRect/>
-          <a:stretch>
-            <a:fillRect/>
-          </a:stretch>
-        </p:blipFill>
-        <p:spPr bwMode="auto">
-          <a:xfrm>
-            <a:off x="5866859" y="1448324"/>
-            <a:ext cx="662081" cy="373524"/>
-          </a:xfrm>
-          <a:prstGeom prst="rect">
-            <a:avLst/>
-          </a:prstGeom>
-          <a:noFill/>
-          <a:extLst>
-            <a:ext uri="{909E8E84-426E-40DD-AFC4-6F175D3DCCD1}">
-              <a14:hiddenFill xmlns:a14="http://schemas.microsoft.com/office/drawing/2010/main">
-                <a:solidFill>
-                  <a:srgbClr val="FFFFFF"/>
-                </a:solidFill>
-              </a14:hiddenFill>
-            </a:ext>
-          </a:extLst>
-        </p:spPr>
-      </p:pic>
-      <p:sp>
-        <p:nvSpPr>
-          <p:cNvPr id="4" name="CuadroTexto 3">
-            <a:extLst>
-              <a:ext uri="{FF2B5EF4-FFF2-40B4-BE49-F238E27FC236}">
-                <a16:creationId xmlns:a16="http://schemas.microsoft.com/office/drawing/2014/main" id="{09177501-000A-3371-0005-F13FC6FD31F2}"/>
-              </a:ext>
-            </a:extLst>
-          </p:cNvPr>
-          <p:cNvSpPr txBox="1"/>
-          <p:nvPr/>
-        </p:nvSpPr>
-        <p:spPr>
-          <a:xfrm>
-            <a:off x="5176935" y="1949185"/>
-            <a:ext cx="1990530" cy="1015663"/>
-          </a:xfrm>
-          <a:prstGeom prst="rect">
-            <a:avLst/>
-          </a:prstGeom>
-          <a:noFill/>
-        </p:spPr>
-        <p:txBody>
-          <a:bodyPr wrap="square" rtlCol="0">
-            <a:spAutoFit/>
-          </a:bodyPr>
-          <a:lstStyle/>
-          <a:p>
-            <a:pPr marL="285750" indent="-285750">
-              <a:buFont typeface="Arial" panose="020B0604020202020204" pitchFamily="34" charset="0"/>
-              <a:buChar char="•"/>
-            </a:pPr>
-            <a:r>
-              <a:rPr lang="es-ES" sz="1200" b="1" dirty="0">
-                <a:solidFill>
-                  <a:schemeClr val="bg1"/>
-                </a:solidFill>
-              </a:rPr>
-              <a:t>La Botiga </a:t>
-            </a:r>
-            <a:r>
-              <a:rPr lang="es-ES" sz="1200" b="1" dirty="0" err="1">
-                <a:solidFill>
-                  <a:schemeClr val="bg1"/>
-                </a:solidFill>
-              </a:rPr>
-              <a:t>Market</a:t>
-            </a:r>
-            <a:endParaRPr lang="es-ES" sz="1200" b="1" dirty="0">
-              <a:solidFill>
-                <a:schemeClr val="bg1"/>
-              </a:solidFill>
-            </a:endParaRPr>
-          </a:p>
-          <a:p>
-            <a:pPr marL="285750" indent="-285750">
-              <a:buFont typeface="Arial" panose="020B0604020202020204" pitchFamily="34" charset="0"/>
-              <a:buChar char="•"/>
-            </a:pPr>
-            <a:r>
-              <a:rPr lang="es-ES" sz="1200" b="1" dirty="0">
-                <a:solidFill>
-                  <a:schemeClr val="bg1"/>
-                </a:solidFill>
-              </a:rPr>
-              <a:t>MIM </a:t>
-            </a:r>
-            <a:r>
-              <a:rPr lang="es-ES" sz="1200" b="1" dirty="0" err="1">
-                <a:solidFill>
-                  <a:schemeClr val="bg1"/>
-                </a:solidFill>
-              </a:rPr>
-              <a:t>Maintenance</a:t>
-            </a:r>
-            <a:endParaRPr lang="es-ES" sz="1200" b="1" dirty="0">
-              <a:solidFill>
-                <a:schemeClr val="bg1"/>
-              </a:solidFill>
-            </a:endParaRPr>
-          </a:p>
-          <a:p>
-            <a:pPr marL="285750" indent="-285750">
-              <a:buFont typeface="Arial" panose="020B0604020202020204" pitchFamily="34" charset="0"/>
-              <a:buChar char="•"/>
-            </a:pPr>
-            <a:r>
-              <a:rPr lang="es-ES" sz="1200" b="1" dirty="0">
-                <a:solidFill>
-                  <a:schemeClr val="bg1"/>
-                </a:solidFill>
-              </a:rPr>
-              <a:t>MIM Patchworkservice</a:t>
-            </a:r>
-          </a:p>
-          <a:p>
-            <a:pPr marL="285750" indent="-285750">
-              <a:buFont typeface="Arial" panose="020B0604020202020204" pitchFamily="34" charset="0"/>
-              <a:buChar char="•"/>
-            </a:pPr>
-            <a:r>
-              <a:rPr lang="es-ES" sz="1200" b="1" dirty="0">
-                <a:solidFill>
-                  <a:schemeClr val="bg1"/>
-                </a:solidFill>
-              </a:rPr>
-              <a:t>MIM Metal</a:t>
-            </a:r>
-          </a:p>
-          <a:p>
-            <a:pPr marL="285750" indent="-285750">
-              <a:buFont typeface="Arial" panose="020B0604020202020204" pitchFamily="34" charset="0"/>
-              <a:buChar char="•"/>
-            </a:pPr>
-            <a:r>
-              <a:rPr lang="es-ES" sz="1200" b="1" dirty="0">
-                <a:solidFill>
-                  <a:schemeClr val="bg1"/>
-                </a:solidFill>
-              </a:rPr>
-              <a:t>MIM Net</a:t>
-            </a:r>
-          </a:p>
-        </p:txBody>
-      </p:sp>
-      <p:sp>
-        <p:nvSpPr>
-          <p:cNvPr id="6" name="Rectángulo 5">
-            <a:extLst>
-              <a:ext uri="{FF2B5EF4-FFF2-40B4-BE49-F238E27FC236}">
-                <a16:creationId xmlns:a16="http://schemas.microsoft.com/office/drawing/2014/main" id="{F07C902D-20FC-1765-DB0E-5D9EB515C32F}"/>
+      <p:sp>
+        <p:nvSpPr>
+          <p:cNvPr id="1048" name="Rectángulo 1047">
+            <a:extLst>
+              <a:ext uri="{FF2B5EF4-FFF2-40B4-BE49-F238E27FC236}">
+                <a16:creationId xmlns:a16="http://schemas.microsoft.com/office/drawing/2014/main" id="{EA8401A6-BD9D-1DD2-989F-B0A3053B2230}"/>
               </a:ext>
             </a:extLst>
           </p:cNvPr>
@@ -3671,8 +3509,8 @@
         </p:nvSpPr>
         <p:spPr>
           <a:xfrm>
-            <a:off x="2503714" y="297056"/>
-            <a:ext cx="1990531" cy="866215"/>
+            <a:off x="7328148" y="792833"/>
+            <a:ext cx="1131339" cy="866213"/>
           </a:xfrm>
           <a:prstGeom prst="rect">
             <a:avLst/>
@@ -3712,12 +3550,398 @@
           </a:p>
         </p:txBody>
       </p:sp>
+      <p:sp>
+        <p:nvSpPr>
+          <p:cNvPr id="1031" name="Rectángulo 1030">
+            <a:extLst>
+              <a:ext uri="{FF2B5EF4-FFF2-40B4-BE49-F238E27FC236}">
+                <a16:creationId xmlns:a16="http://schemas.microsoft.com/office/drawing/2014/main" id="{238CED9E-08AF-4C22-6B20-C1A822BF435C}"/>
+              </a:ext>
+            </a:extLst>
+          </p:cNvPr>
+          <p:cNvSpPr/>
+          <p:nvPr/>
+        </p:nvSpPr>
+        <p:spPr>
+          <a:xfrm>
+            <a:off x="431227" y="5417762"/>
+            <a:ext cx="1470659" cy="846100"/>
+          </a:xfrm>
+          <a:prstGeom prst="rect">
+            <a:avLst/>
+          </a:prstGeom>
+          <a:solidFill>
+            <a:schemeClr val="tx1">
+              <a:lumMod val="75000"/>
+              <a:lumOff val="25000"/>
+            </a:schemeClr>
+          </a:solidFill>
+          <a:ln>
+            <a:noFill/>
+          </a:ln>
+        </p:spPr>
+        <p:style>
+          <a:lnRef idx="2">
+            <a:schemeClr val="accent1">
+              <a:shade val="15000"/>
+            </a:schemeClr>
+          </a:lnRef>
+          <a:fillRef idx="1">
+            <a:schemeClr val="accent1"/>
+          </a:fillRef>
+          <a:effectRef idx="0">
+            <a:schemeClr val="accent1"/>
+          </a:effectRef>
+          <a:fontRef idx="minor">
+            <a:schemeClr val="lt1"/>
+          </a:fontRef>
+        </p:style>
+        <p:txBody>
+          <a:bodyPr rtlCol="0" anchor="ctr"/>
+          <a:lstStyle/>
+          <a:p>
+            <a:pPr algn="ctr"/>
+            <a:endParaRPr lang="es-ES"/>
+          </a:p>
+        </p:txBody>
+      </p:sp>
+      <p:sp>
+        <p:nvSpPr>
+          <p:cNvPr id="1033" name="CuadroTexto 1032">
+            <a:extLst>
+              <a:ext uri="{FF2B5EF4-FFF2-40B4-BE49-F238E27FC236}">
+                <a16:creationId xmlns:a16="http://schemas.microsoft.com/office/drawing/2014/main" id="{B0937C89-D372-6472-DB35-4E62D45103D3}"/>
+              </a:ext>
+            </a:extLst>
+          </p:cNvPr>
+          <p:cNvSpPr txBox="1"/>
+          <p:nvPr/>
+        </p:nvSpPr>
+        <p:spPr>
+          <a:xfrm>
+            <a:off x="480219" y="5732480"/>
+            <a:ext cx="1084991" cy="523220"/>
+          </a:xfrm>
+          <a:prstGeom prst="rect">
+            <a:avLst/>
+          </a:prstGeom>
+          <a:noFill/>
+        </p:spPr>
+        <p:txBody>
+          <a:bodyPr wrap="square" rtlCol="0">
+            <a:spAutoFit/>
+          </a:bodyPr>
+          <a:lstStyle/>
+          <a:p>
+            <a:r>
+              <a:rPr lang="es-ES" sz="1000" b="1" dirty="0">
+                <a:solidFill>
+                  <a:schemeClr val="bg1"/>
+                </a:solidFill>
+              </a:rPr>
+              <a:t>Google Merchant Center</a:t>
+            </a:r>
+          </a:p>
+          <a:p>
+            <a:r>
+              <a:rPr lang="es-ES" sz="800" dirty="0">
+                <a:solidFill>
+                  <a:srgbClr val="CC99FF"/>
+                </a:solidFill>
+              </a:rPr>
+              <a:t>Click see more</a:t>
+            </a:r>
+          </a:p>
+        </p:txBody>
+      </p:sp>
+      <p:sp>
+        <p:nvSpPr>
+          <p:cNvPr id="61" name="Rectángulo 60">
+            <a:extLst>
+              <a:ext uri="{FF2B5EF4-FFF2-40B4-BE49-F238E27FC236}">
+                <a16:creationId xmlns:a16="http://schemas.microsoft.com/office/drawing/2014/main" id="{76699841-3DE5-4167-CADD-081E434CA084}"/>
+              </a:ext>
+            </a:extLst>
+          </p:cNvPr>
+          <p:cNvSpPr/>
+          <p:nvPr/>
+        </p:nvSpPr>
+        <p:spPr>
+          <a:xfrm>
+            <a:off x="418114" y="3572814"/>
+            <a:ext cx="1470659" cy="846100"/>
+          </a:xfrm>
+          <a:prstGeom prst="rect">
+            <a:avLst/>
+          </a:prstGeom>
+          <a:solidFill>
+            <a:schemeClr val="tx1">
+              <a:lumMod val="75000"/>
+              <a:lumOff val="25000"/>
+            </a:schemeClr>
+          </a:solidFill>
+          <a:ln>
+            <a:noFill/>
+          </a:ln>
+        </p:spPr>
+        <p:style>
+          <a:lnRef idx="2">
+            <a:schemeClr val="accent1">
+              <a:shade val="15000"/>
+            </a:schemeClr>
+          </a:lnRef>
+          <a:fillRef idx="1">
+            <a:schemeClr val="accent1"/>
+          </a:fillRef>
+          <a:effectRef idx="0">
+            <a:schemeClr val="accent1"/>
+          </a:effectRef>
+          <a:fontRef idx="minor">
+            <a:schemeClr val="lt1"/>
+          </a:fontRef>
+        </p:style>
+        <p:txBody>
+          <a:bodyPr rtlCol="0" anchor="ctr"/>
+          <a:lstStyle/>
+          <a:p>
+            <a:pPr algn="ctr"/>
+            <a:endParaRPr lang="es-ES"/>
+          </a:p>
+        </p:txBody>
+      </p:sp>
+      <p:sp>
+        <p:nvSpPr>
+          <p:cNvPr id="59" name="Rectángulo 58">
+            <a:extLst>
+              <a:ext uri="{FF2B5EF4-FFF2-40B4-BE49-F238E27FC236}">
+                <a16:creationId xmlns:a16="http://schemas.microsoft.com/office/drawing/2014/main" id="{99A53E2B-2664-38A5-BAE3-874EAC30DA54}"/>
+              </a:ext>
+            </a:extLst>
+          </p:cNvPr>
+          <p:cNvSpPr/>
+          <p:nvPr/>
+        </p:nvSpPr>
+        <p:spPr>
+          <a:xfrm>
+            <a:off x="403792" y="2656528"/>
+            <a:ext cx="1470659" cy="846100"/>
+          </a:xfrm>
+          <a:prstGeom prst="rect">
+            <a:avLst/>
+          </a:prstGeom>
+          <a:solidFill>
+            <a:schemeClr val="tx1">
+              <a:lumMod val="75000"/>
+              <a:lumOff val="25000"/>
+            </a:schemeClr>
+          </a:solidFill>
+          <a:ln>
+            <a:noFill/>
+          </a:ln>
+        </p:spPr>
+        <p:style>
+          <a:lnRef idx="2">
+            <a:schemeClr val="accent1">
+              <a:shade val="15000"/>
+            </a:schemeClr>
+          </a:lnRef>
+          <a:fillRef idx="1">
+            <a:schemeClr val="accent1"/>
+          </a:fillRef>
+          <a:effectRef idx="0">
+            <a:schemeClr val="accent1"/>
+          </a:effectRef>
+          <a:fontRef idx="minor">
+            <a:schemeClr val="lt1"/>
+          </a:fontRef>
+        </p:style>
+        <p:txBody>
+          <a:bodyPr rtlCol="0" anchor="ctr"/>
+          <a:lstStyle/>
+          <a:p>
+            <a:pPr algn="ctr"/>
+            <a:endParaRPr lang="es-ES"/>
+          </a:p>
+        </p:txBody>
+      </p:sp>
+      <p:sp>
+        <p:nvSpPr>
+          <p:cNvPr id="60" name="CuadroTexto 59">
+            <a:extLst>
+              <a:ext uri="{FF2B5EF4-FFF2-40B4-BE49-F238E27FC236}">
+                <a16:creationId xmlns:a16="http://schemas.microsoft.com/office/drawing/2014/main" id="{DBA16627-0FF1-5389-E2F9-ABD655ACBD98}"/>
+              </a:ext>
+            </a:extLst>
+          </p:cNvPr>
+          <p:cNvSpPr txBox="1"/>
+          <p:nvPr/>
+        </p:nvSpPr>
+        <p:spPr>
+          <a:xfrm>
+            <a:off x="452784" y="2971246"/>
+            <a:ext cx="1084991" cy="369332"/>
+          </a:xfrm>
+          <a:prstGeom prst="rect">
+            <a:avLst/>
+          </a:prstGeom>
+          <a:noFill/>
+        </p:spPr>
+        <p:txBody>
+          <a:bodyPr wrap="square" rtlCol="0">
+            <a:spAutoFit/>
+          </a:bodyPr>
+          <a:lstStyle/>
+          <a:p>
+            <a:r>
+              <a:rPr lang="es-ES" sz="1000" b="1" dirty="0">
+                <a:solidFill>
+                  <a:schemeClr val="bg1"/>
+                </a:solidFill>
+              </a:rPr>
+              <a:t>Google </a:t>
+            </a:r>
+            <a:r>
+              <a:rPr lang="es-ES" sz="1000" b="1" dirty="0" err="1">
+                <a:solidFill>
+                  <a:schemeClr val="bg1"/>
+                </a:solidFill>
+              </a:rPr>
+              <a:t>Analytics</a:t>
+            </a:r>
+            <a:endParaRPr lang="es-ES" sz="1000" b="1" dirty="0">
+              <a:solidFill>
+                <a:schemeClr val="bg1"/>
+              </a:solidFill>
+            </a:endParaRPr>
+          </a:p>
+          <a:p>
+            <a:r>
+              <a:rPr lang="es-ES" sz="800" dirty="0">
+                <a:solidFill>
+                  <a:srgbClr val="CC99FF"/>
+                </a:solidFill>
+              </a:rPr>
+              <a:t>Click see more</a:t>
+            </a:r>
+          </a:p>
+        </p:txBody>
+      </p:sp>
+      <p:sp>
+        <p:nvSpPr>
+          <p:cNvPr id="53" name="Rectángulo 52">
+            <a:extLst>
+              <a:ext uri="{FF2B5EF4-FFF2-40B4-BE49-F238E27FC236}">
+                <a16:creationId xmlns:a16="http://schemas.microsoft.com/office/drawing/2014/main" id="{9A8481A9-3E93-B1B5-982A-B866C27E19C1}"/>
+              </a:ext>
+            </a:extLst>
+          </p:cNvPr>
+          <p:cNvSpPr/>
+          <p:nvPr/>
+        </p:nvSpPr>
+        <p:spPr>
+          <a:xfrm>
+            <a:off x="403792" y="1739032"/>
+            <a:ext cx="1470659" cy="846100"/>
+          </a:xfrm>
+          <a:prstGeom prst="rect">
+            <a:avLst/>
+          </a:prstGeom>
+          <a:solidFill>
+            <a:schemeClr val="tx1">
+              <a:lumMod val="75000"/>
+              <a:lumOff val="25000"/>
+            </a:schemeClr>
+          </a:solidFill>
+          <a:ln>
+            <a:noFill/>
+          </a:ln>
+        </p:spPr>
+        <p:style>
+          <a:lnRef idx="2">
+            <a:schemeClr val="accent1">
+              <a:shade val="15000"/>
+            </a:schemeClr>
+          </a:lnRef>
+          <a:fillRef idx="1">
+            <a:schemeClr val="accent1"/>
+          </a:fillRef>
+          <a:effectRef idx="0">
+            <a:schemeClr val="accent1"/>
+          </a:effectRef>
+          <a:fontRef idx="minor">
+            <a:schemeClr val="lt1"/>
+          </a:fontRef>
+        </p:style>
+        <p:txBody>
+          <a:bodyPr rtlCol="0" anchor="ctr"/>
+          <a:lstStyle/>
+          <a:p>
+            <a:pPr algn="ctr"/>
+            <a:endParaRPr lang="es-ES"/>
+          </a:p>
+        </p:txBody>
+      </p:sp>
+      <p:sp>
+        <p:nvSpPr>
+          <p:cNvPr id="34" name="Rectángulo 33">
+            <a:extLst>
+              <a:ext uri="{FF2B5EF4-FFF2-40B4-BE49-F238E27FC236}">
+                <a16:creationId xmlns:a16="http://schemas.microsoft.com/office/drawing/2014/main" id="{27FA3D9C-C65A-6E2B-4671-DFD9AD2EDF80}"/>
+              </a:ext>
+            </a:extLst>
+          </p:cNvPr>
+          <p:cNvSpPr/>
+          <p:nvPr/>
+        </p:nvSpPr>
+        <p:spPr>
+          <a:xfrm>
+            <a:off x="7328148" y="1792099"/>
+            <a:ext cx="1131339" cy="838272"/>
+          </a:xfrm>
+          <a:prstGeom prst="rect">
+            <a:avLst/>
+          </a:prstGeom>
+          <a:solidFill>
+            <a:schemeClr val="tx1">
+              <a:lumMod val="75000"/>
+              <a:lumOff val="25000"/>
+            </a:schemeClr>
+          </a:solidFill>
+          <a:ln>
+            <a:noFill/>
+          </a:ln>
+        </p:spPr>
+        <p:style>
+          <a:lnRef idx="2">
+            <a:schemeClr val="accent1">
+              <a:shade val="15000"/>
+            </a:schemeClr>
+          </a:lnRef>
+          <a:fillRef idx="1">
+            <a:schemeClr val="accent1"/>
+          </a:fillRef>
+          <a:effectRef idx="0">
+            <a:schemeClr val="accent1"/>
+          </a:effectRef>
+          <a:fontRef idx="minor">
+            <a:schemeClr val="lt1"/>
+          </a:fontRef>
+        </p:style>
+        <p:txBody>
+          <a:bodyPr rtlCol="0" anchor="ctr"/>
+          <a:lstStyle/>
+          <a:p>
+            <a:pPr algn="ctr"/>
+            <a:endParaRPr lang="es-ES"/>
+          </a:p>
+        </p:txBody>
+      </p:sp>
       <p:pic>
         <p:nvPicPr>
-          <p:cNvPr id="1028" name="Picture 4" descr="Opiniones de WooCommerce (plugin para Wordpress) - Webolto">
-            <a:extLst>
-              <a:ext uri="{FF2B5EF4-FFF2-40B4-BE49-F238E27FC236}">
-                <a16:creationId xmlns:a16="http://schemas.microsoft.com/office/drawing/2014/main" id="{36220312-A696-D439-E452-22CC6AB1E655}"/>
+          <p:cNvPr id="1036" name="Picture 12" descr="Sendcloud - eDesk | Faster, smarter customer support software for eCommerce">
+            <a:extLst>
+              <a:ext uri="{FF2B5EF4-FFF2-40B4-BE49-F238E27FC236}">
+                <a16:creationId xmlns:a16="http://schemas.microsoft.com/office/drawing/2014/main" id="{FB26D9F2-3055-01E3-E26C-FEDD69AD080B}"/>
               </a:ext>
             </a:extLst>
           </p:cNvPr>
@@ -3726,8 +3950,108 @@
           </p:cNvPicPr>
           <p:nvPr/>
         </p:nvPicPr>
+        <p:blipFill rotWithShape="1">
+          <a:blip r:embed="rId2">
+            <a:extLst>
+              <a:ext uri="{28A0092B-C50C-407E-A947-70E740481C1C}">
+                <a14:useLocalDpi xmlns:a14="http://schemas.microsoft.com/office/drawing/2010/main" val="0"/>
+              </a:ext>
+            </a:extLst>
+          </a:blip>
+          <a:srcRect l="913" t="16199" r="-913" b="32245"/>
+          <a:stretch/>
+        </p:blipFill>
+        <p:spPr bwMode="auto">
+          <a:xfrm>
+            <a:off x="430773" y="1792099"/>
+            <a:ext cx="936488" cy="204830"/>
+          </a:xfrm>
+          <a:prstGeom prst="rect">
+            <a:avLst/>
+          </a:prstGeom>
+          <a:noFill/>
+          <a:extLst>
+            <a:ext uri="{909E8E84-426E-40DD-AFC4-6F175D3DCCD1}">
+              <a14:hiddenFill xmlns:a14="http://schemas.microsoft.com/office/drawing/2010/main">
+                <a:solidFill>
+                  <a:srgbClr val="FFFFFF"/>
+                </a:solidFill>
+              </a14:hiddenFill>
+            </a:ext>
+          </a:extLst>
+        </p:spPr>
+      </p:pic>
+      <p:sp>
+        <p:nvSpPr>
+          <p:cNvPr id="5" name="Rectángulo 4">
+            <a:extLst>
+              <a:ext uri="{FF2B5EF4-FFF2-40B4-BE49-F238E27FC236}">
+                <a16:creationId xmlns:a16="http://schemas.microsoft.com/office/drawing/2014/main" id="{46D190BB-7DAA-7468-96E0-6D7EB560655C}"/>
+              </a:ext>
+            </a:extLst>
+          </p:cNvPr>
+          <p:cNvSpPr/>
+          <p:nvPr/>
+        </p:nvSpPr>
+        <p:spPr>
+          <a:xfrm>
+            <a:off x="4958962" y="792834"/>
+            <a:ext cx="1177948" cy="3732086"/>
+          </a:xfrm>
+          <a:prstGeom prst="rect">
+            <a:avLst/>
+          </a:prstGeom>
+          <a:solidFill>
+            <a:schemeClr val="tx1">
+              <a:lumMod val="75000"/>
+              <a:lumOff val="25000"/>
+            </a:schemeClr>
+          </a:solidFill>
+          <a:ln>
+            <a:noFill/>
+          </a:ln>
+        </p:spPr>
+        <p:style>
+          <a:lnRef idx="2">
+            <a:schemeClr val="accent1">
+              <a:shade val="15000"/>
+            </a:schemeClr>
+          </a:lnRef>
+          <a:fillRef idx="1">
+            <a:schemeClr val="accent1"/>
+          </a:fillRef>
+          <a:effectRef idx="0">
+            <a:schemeClr val="accent1"/>
+          </a:effectRef>
+          <a:fontRef idx="minor">
+            <a:schemeClr val="lt1"/>
+          </a:fontRef>
+        </p:style>
+        <p:txBody>
+          <a:bodyPr rtlCol="0" anchor="ctr"/>
+          <a:lstStyle/>
+          <a:p>
+            <a:pPr algn="ctr"/>
+            <a:endParaRPr lang="es-ES"/>
+          </a:p>
+        </p:txBody>
+      </p:sp>
+      <p:pic>
+        <p:nvPicPr>
+          <p:cNvPr id="1026" name="Picture 2" descr="Sage Group - Wikipedia">
+            <a:extLst>
+              <a:ext uri="{FF2B5EF4-FFF2-40B4-BE49-F238E27FC236}">
+                <a16:creationId xmlns:a16="http://schemas.microsoft.com/office/drawing/2014/main" id="{C62A70CC-B076-808A-8E42-664CF461FF38}"/>
+              </a:ext>
+            </a:extLst>
+          </p:cNvPr>
+          <p:cNvPicPr>
+            <a:picLocks noChangeAspect="1" noChangeArrowheads="1"/>
+          </p:cNvPicPr>
+          <p:nvPr/>
+        </p:nvPicPr>
         <p:blipFill>
-          <a:blip r:embed="rId4">
+          <a:blip r:embed="rId3">
             <a:extLst>
               <a:ext uri="{28A0092B-C50C-407E-A947-70E740481C1C}">
                 <a14:useLocalDpi xmlns:a14="http://schemas.microsoft.com/office/drawing/2010/main" val="0"/>
@@ -3741,8 +4065,8 @@
         </p:blipFill>
         <p:spPr bwMode="auto">
           <a:xfrm>
-            <a:off x="2561156" y="397170"/>
-            <a:ext cx="452634" cy="323310"/>
+            <a:off x="5101672" y="923528"/>
+            <a:ext cx="462045" cy="260670"/>
           </a:xfrm>
           <a:prstGeom prst="rect">
             <a:avLst/>
@@ -3761,43 +4085,106 @@
       </p:pic>
       <p:sp>
         <p:nvSpPr>
-          <p:cNvPr id="7" name="CuadroTexto 6">
-            <a:extLst>
-              <a:ext uri="{FF2B5EF4-FFF2-40B4-BE49-F238E27FC236}">
-                <a16:creationId xmlns:a16="http://schemas.microsoft.com/office/drawing/2014/main" id="{ACE270AA-D5F4-C51E-F4E3-B015BAC30CE9}"/>
-              </a:ext>
-            </a:extLst>
-          </p:cNvPr>
-          <p:cNvSpPr txBox="1"/>
-          <p:nvPr/>
-        </p:nvSpPr>
-        <p:spPr>
-          <a:xfrm>
-            <a:off x="2561156" y="724141"/>
-            <a:ext cx="1852224" cy="276999"/>
+          <p:cNvPr id="6" name="Rectángulo 5">
+            <a:extLst>
+              <a:ext uri="{FF2B5EF4-FFF2-40B4-BE49-F238E27FC236}">
+                <a16:creationId xmlns:a16="http://schemas.microsoft.com/office/drawing/2014/main" id="{F07C902D-20FC-1765-DB0E-5D9EB515C32F}"/>
+              </a:ext>
+            </a:extLst>
+          </p:cNvPr>
+          <p:cNvSpPr/>
+          <p:nvPr/>
+        </p:nvSpPr>
+        <p:spPr>
+          <a:xfrm>
+            <a:off x="2865510" y="792833"/>
+            <a:ext cx="1131339" cy="5457923"/>
           </a:xfrm>
           <a:prstGeom prst="rect">
             <a:avLst/>
           </a:prstGeom>
+          <a:solidFill>
+            <a:schemeClr val="tx1">
+              <a:lumMod val="75000"/>
+              <a:lumOff val="25000"/>
+            </a:schemeClr>
+          </a:solidFill>
+          <a:ln>
+            <a:noFill/>
+          </a:ln>
+        </p:spPr>
+        <p:style>
+          <a:lnRef idx="2">
+            <a:schemeClr val="accent1">
+              <a:shade val="15000"/>
+            </a:schemeClr>
+          </a:lnRef>
+          <a:fillRef idx="1">
+            <a:schemeClr val="accent1"/>
+          </a:fillRef>
+          <a:effectRef idx="0">
+            <a:schemeClr val="accent1"/>
+          </a:effectRef>
+          <a:fontRef idx="minor">
+            <a:schemeClr val="lt1"/>
+          </a:fontRef>
+        </p:style>
+        <p:txBody>
+          <a:bodyPr rtlCol="0" anchor="ctr"/>
+          <a:lstStyle/>
+          <a:p>
+            <a:pPr algn="ctr"/>
+            <a:endParaRPr lang="es-ES"/>
+          </a:p>
+        </p:txBody>
+      </p:sp>
+      <p:pic>
+        <p:nvPicPr>
+          <p:cNvPr id="1028" name="Picture 4" descr="Opiniones de WooCommerce (plugin para Wordpress) - Webolto">
+            <a:extLst>
+              <a:ext uri="{FF2B5EF4-FFF2-40B4-BE49-F238E27FC236}">
+                <a16:creationId xmlns:a16="http://schemas.microsoft.com/office/drawing/2014/main" id="{36220312-A696-D439-E452-22CC6AB1E655}"/>
+              </a:ext>
+            </a:extLst>
+          </p:cNvPr>
+          <p:cNvPicPr>
+            <a:picLocks noChangeAspect="1" noChangeArrowheads="1"/>
+          </p:cNvPicPr>
+          <p:nvPr/>
+        </p:nvPicPr>
+        <p:blipFill>
+          <a:blip r:embed="rId4">
+            <a:extLst>
+              <a:ext uri="{28A0092B-C50C-407E-A947-70E740481C1C}">
+                <a14:useLocalDpi xmlns:a14="http://schemas.microsoft.com/office/drawing/2010/main" val="0"/>
+              </a:ext>
+            </a:extLst>
+          </a:blip>
+          <a:srcRect/>
+          <a:stretch>
+            <a:fillRect/>
+          </a:stretch>
+        </p:blipFill>
+        <p:spPr bwMode="auto">
+          <a:xfrm>
+            <a:off x="2937329" y="862598"/>
+            <a:ext cx="452634" cy="323310"/>
+          </a:xfrm>
+          <a:prstGeom prst="rect">
+            <a:avLst/>
+          </a:prstGeom>
           <a:noFill/>
-        </p:spPr>
-        <p:txBody>
-          <a:bodyPr wrap="square" rtlCol="0">
-            <a:spAutoFit/>
-          </a:bodyPr>
-          <a:lstStyle/>
-          <a:p>
-            <a:r>
-              <a:rPr lang="es-ES" sz="1200" b="1" dirty="0">
-                <a:solidFill>
-                  <a:schemeClr val="bg1"/>
-                </a:solidFill>
-              </a:rPr>
-              <a:t>La Botiga eCommerce</a:t>
-            </a:r>
-          </a:p>
-        </p:txBody>
-      </p:sp>
+          <a:extLst>
+            <a:ext uri="{909E8E84-426E-40DD-AFC4-6F175D3DCCD1}">
+              <a14:hiddenFill xmlns:a14="http://schemas.microsoft.com/office/drawing/2010/main">
+                <a:solidFill>
+                  <a:srgbClr val="FFFFFF"/>
+                </a:solidFill>
+              </a14:hiddenFill>
+            </a:ext>
+          </a:extLst>
+        </p:spPr>
+      </p:pic>
       <p:cxnSp>
         <p:nvCxnSpPr>
           <p:cNvPr id="9" name="Conector recto de flecha 8">
@@ -3814,13 +4201,13 @@
         </p:nvCxnSpPr>
         <p:spPr>
           <a:xfrm>
-            <a:off x="2017458" y="745453"/>
-            <a:ext cx="393443" cy="0"/>
+            <a:off x="2112383" y="1356356"/>
+            <a:ext cx="669313" cy="0"/>
           </a:xfrm>
           <a:prstGeom prst="straightConnector1">
             <a:avLst/>
           </a:prstGeom>
-          <a:ln w="28575">
+          <a:ln w="19050">
             <a:solidFill>
               <a:schemeClr val="tx1">
                 <a:lumMod val="75000"/>
@@ -3861,13 +4248,13 @@
         </p:nvCxnSpPr>
         <p:spPr>
           <a:xfrm flipH="1">
-            <a:off x="1966141" y="883952"/>
-            <a:ext cx="444760" cy="0"/>
+            <a:off x="2000070" y="1467593"/>
+            <a:ext cx="640633" cy="0"/>
           </a:xfrm>
           <a:prstGeom prst="straightConnector1">
             <a:avLst/>
           </a:prstGeom>
-          <a:ln w="28575">
+          <a:ln w="19050">
             <a:solidFill>
               <a:schemeClr val="tx1">
                 <a:lumMod val="75000"/>
@@ -3894,10 +4281,106 @@
       </p:cxnSp>
       <p:sp>
         <p:nvSpPr>
-          <p:cNvPr id="12" name="Rectángulo 11">
-            <a:extLst>
-              <a:ext uri="{FF2B5EF4-FFF2-40B4-BE49-F238E27FC236}">
-                <a16:creationId xmlns:a16="http://schemas.microsoft.com/office/drawing/2014/main" id="{FCB557EC-7294-FEE9-3C74-3F0EEDD25295}"/>
+          <p:cNvPr id="15" name="CuadroTexto 14">
+            <a:extLst>
+              <a:ext uri="{FF2B5EF4-FFF2-40B4-BE49-F238E27FC236}">
+                <a16:creationId xmlns:a16="http://schemas.microsoft.com/office/drawing/2014/main" id="{2F2A6FAE-0084-E6BC-FC97-E258478BA184}"/>
+              </a:ext>
+            </a:extLst>
+          </p:cNvPr>
+          <p:cNvSpPr txBox="1"/>
+          <p:nvPr/>
+        </p:nvSpPr>
+        <p:spPr>
+          <a:xfrm>
+            <a:off x="1945072" y="924818"/>
+            <a:ext cx="979909" cy="369332"/>
+          </a:xfrm>
+          <a:prstGeom prst="rect">
+            <a:avLst/>
+          </a:prstGeom>
+          <a:noFill/>
+        </p:spPr>
+        <p:txBody>
+          <a:bodyPr wrap="square" rtlCol="0">
+            <a:spAutoFit/>
+          </a:bodyPr>
+          <a:lstStyle/>
+          <a:p>
+            <a:r>
+              <a:rPr lang="es-ES" sz="1000" b="1" dirty="0">
+                <a:solidFill>
+                  <a:schemeClr val="bg1"/>
+                </a:solidFill>
+              </a:rPr>
+              <a:t>API</a:t>
+            </a:r>
+          </a:p>
+          <a:p>
+            <a:r>
+              <a:rPr lang="es-ES" sz="800" dirty="0">
+                <a:solidFill>
+                  <a:srgbClr val="CC99FF"/>
+                </a:solidFill>
+              </a:rPr>
+              <a:t>Click see more</a:t>
+            </a:r>
+          </a:p>
+        </p:txBody>
+      </p:sp>
+      <p:pic>
+        <p:nvPicPr>
+          <p:cNvPr id="1030" name="Picture 6" descr="HIOFFICE - Arpe Lanzarote %">
+            <a:extLst>
+              <a:ext uri="{FF2B5EF4-FFF2-40B4-BE49-F238E27FC236}">
+                <a16:creationId xmlns:a16="http://schemas.microsoft.com/office/drawing/2014/main" id="{2667CF03-6F24-0AD5-301D-4BCFE6655A86}"/>
+              </a:ext>
+            </a:extLst>
+          </p:cNvPr>
+          <p:cNvPicPr>
+            <a:picLocks noChangeAspect="1" noChangeArrowheads="1"/>
+          </p:cNvPicPr>
+          <p:nvPr/>
+        </p:nvPicPr>
+        <p:blipFill>
+          <a:blip r:embed="rId5">
+            <a:extLst>
+              <a:ext uri="{28A0092B-C50C-407E-A947-70E740481C1C}">
+                <a14:useLocalDpi xmlns:a14="http://schemas.microsoft.com/office/drawing/2010/main" val="0"/>
+              </a:ext>
+            </a:extLst>
+          </a:blip>
+          <a:srcRect/>
+          <a:stretch>
+            <a:fillRect/>
+          </a:stretch>
+        </p:blipFill>
+        <p:spPr bwMode="auto">
+          <a:xfrm>
+            <a:off x="7468717" y="998847"/>
+            <a:ext cx="639170" cy="91614"/>
+          </a:xfrm>
+          <a:prstGeom prst="rect">
+            <a:avLst/>
+          </a:prstGeom>
+          <a:noFill/>
+          <a:extLst>
+            <a:ext uri="{909E8E84-426E-40DD-AFC4-6F175D3DCCD1}">
+              <a14:hiddenFill xmlns:a14="http://schemas.microsoft.com/office/drawing/2010/main">
+                <a:solidFill>
+                  <a:srgbClr val="FFFFFF"/>
+                </a:solidFill>
+              </a14:hiddenFill>
+            </a:ext>
+          </a:extLst>
+        </p:spPr>
+      </p:pic>
+      <p:sp>
+        <p:nvSpPr>
+          <p:cNvPr id="25" name="Rectángulo 24">
+            <a:extLst>
+              <a:ext uri="{FF2B5EF4-FFF2-40B4-BE49-F238E27FC236}">
+                <a16:creationId xmlns:a16="http://schemas.microsoft.com/office/drawing/2014/main" id="{F11E8DC9-7C2A-1A9C-8A17-7CA8153E4E2D}"/>
               </a:ext>
             </a:extLst>
           </p:cNvPr>
@@ -3906,8 +4389,8 @@
         </p:nvSpPr>
         <p:spPr>
           <a:xfrm>
-            <a:off x="2492002" y="1263385"/>
-            <a:ext cx="1990531" cy="838272"/>
+            <a:off x="391402" y="794245"/>
+            <a:ext cx="1470659" cy="846100"/>
           </a:xfrm>
           <a:prstGeom prst="rect">
             <a:avLst/>
@@ -3949,10 +4432,10 @@
       </p:sp>
       <p:sp>
         <p:nvSpPr>
-          <p:cNvPr id="14" name="CuadroTexto 13">
-            <a:extLst>
-              <a:ext uri="{FF2B5EF4-FFF2-40B4-BE49-F238E27FC236}">
-                <a16:creationId xmlns:a16="http://schemas.microsoft.com/office/drawing/2014/main" id="{0A37B78E-FB94-CAD8-BA7D-61C61218FC06}"/>
+          <p:cNvPr id="26" name="CuadroTexto 25">
+            <a:extLst>
+              <a:ext uri="{FF2B5EF4-FFF2-40B4-BE49-F238E27FC236}">
+                <a16:creationId xmlns:a16="http://schemas.microsoft.com/office/drawing/2014/main" id="{34BBA5FE-81A5-8891-A0A3-6D86437F7412}"/>
               </a:ext>
             </a:extLst>
           </p:cNvPr>
@@ -3961,8 +4444,8 @@
         </p:nvSpPr>
         <p:spPr>
           <a:xfrm>
-            <a:off x="2527533" y="1618547"/>
-            <a:ext cx="1885847" cy="276999"/>
+            <a:off x="433859" y="1199650"/>
+            <a:ext cx="1084991" cy="369332"/>
           </a:xfrm>
           <a:prstGeom prst="rect">
             <a:avLst/>
@@ -3976,61 +4459,32 @@
           <a:lstStyle/>
           <a:p>
             <a:r>
-              <a:rPr lang="es-ES" sz="1200" b="1" dirty="0">
+              <a:rPr lang="es-ES" sz="1000" b="1" dirty="0">
                 <a:solidFill>
                   <a:schemeClr val="bg1"/>
                 </a:solidFill>
               </a:rPr>
-              <a:t>TPV</a:t>
-            </a:r>
-          </a:p>
-        </p:txBody>
-      </p:sp>
-      <p:sp>
-        <p:nvSpPr>
-          <p:cNvPr id="15" name="CuadroTexto 14">
-            <a:extLst>
-              <a:ext uri="{FF2B5EF4-FFF2-40B4-BE49-F238E27FC236}">
-                <a16:creationId xmlns:a16="http://schemas.microsoft.com/office/drawing/2014/main" id="{2F2A6FAE-0084-E6BC-FC97-E258478BA184}"/>
-              </a:ext>
-            </a:extLst>
-          </p:cNvPr>
-          <p:cNvSpPr txBox="1"/>
-          <p:nvPr/>
-        </p:nvSpPr>
-        <p:spPr>
-          <a:xfrm>
-            <a:off x="2017458" y="407156"/>
-            <a:ext cx="510075" cy="276998"/>
-          </a:xfrm>
-          <a:prstGeom prst="rect">
-            <a:avLst/>
-          </a:prstGeom>
-          <a:noFill/>
-        </p:spPr>
-        <p:txBody>
-          <a:bodyPr wrap="square" rtlCol="0">
-            <a:spAutoFit/>
-          </a:bodyPr>
-          <a:lstStyle/>
-          <a:p>
-            <a:r>
-              <a:rPr lang="es-ES" sz="1200" b="1" dirty="0">
-                <a:solidFill>
-                  <a:schemeClr val="bg1"/>
+              <a:t>Tidio</a:t>
+            </a:r>
+          </a:p>
+          <a:p>
+            <a:r>
+              <a:rPr lang="es-ES" sz="800" dirty="0">
+                <a:solidFill>
+                  <a:srgbClr val="CC99FF"/>
                 </a:solidFill>
               </a:rPr>
-              <a:t>API</a:t>
+              <a:t>Click see more</a:t>
             </a:r>
           </a:p>
         </p:txBody>
       </p:sp>
       <p:pic>
         <p:nvPicPr>
-          <p:cNvPr id="1030" name="Picture 6" descr="HIOFFICE - Arpe Lanzarote %">
-            <a:extLst>
-              <a:ext uri="{FF2B5EF4-FFF2-40B4-BE49-F238E27FC236}">
-                <a16:creationId xmlns:a16="http://schemas.microsoft.com/office/drawing/2014/main" id="{2667CF03-6F24-0AD5-301D-4BCFE6655A86}"/>
+          <p:cNvPr id="1032" name="Picture 8" descr="Customer Service Software To Grow Your Business | Tidio">
+            <a:extLst>
+              <a:ext uri="{FF2B5EF4-FFF2-40B4-BE49-F238E27FC236}">
+                <a16:creationId xmlns:a16="http://schemas.microsoft.com/office/drawing/2014/main" id="{E4AFC14D-985B-5EE5-0814-153D80733CEA}"/>
               </a:ext>
             </a:extLst>
           </p:cNvPr>
@@ -4040,7 +4494,7 @@
           <p:nvPr/>
         </p:nvPicPr>
         <p:blipFill>
-          <a:blip r:embed="rId5">
+          <a:blip r:embed="rId6">
             <a:extLst>
               <a:ext uri="{28A0092B-C50C-407E-A947-70E740481C1C}">
                 <a14:useLocalDpi xmlns:a14="http://schemas.microsoft.com/office/drawing/2010/main" val="0"/>
@@ -4054,8 +4508,8 @@
         </p:blipFill>
         <p:spPr bwMode="auto">
           <a:xfrm>
-            <a:off x="2662336" y="1428225"/>
-            <a:ext cx="1061484" cy="152146"/>
+            <a:off x="474413" y="857928"/>
+            <a:ext cx="664709" cy="302773"/>
           </a:xfrm>
           <a:prstGeom prst="rect">
             <a:avLst/>
@@ -4072,12 +4526,200 @@
           </a:extLst>
         </p:spPr>
       </p:pic>
+      <p:pic>
+        <p:nvPicPr>
+          <p:cNvPr id="2" name="Picture 2">
+            <a:extLst>
+              <a:ext uri="{FF2B5EF4-FFF2-40B4-BE49-F238E27FC236}">
+                <a16:creationId xmlns:a16="http://schemas.microsoft.com/office/drawing/2014/main" id="{D72D14C1-2E7A-DB2D-ACC2-0E6D232F6DE5}"/>
+              </a:ext>
+            </a:extLst>
+          </p:cNvPr>
+          <p:cNvPicPr>
+            <a:picLocks noChangeAspect="1" noChangeArrowheads="1"/>
+          </p:cNvPicPr>
+          <p:nvPr/>
+        </p:nvPicPr>
+        <p:blipFill>
+          <a:blip r:embed="rId7">
+            <a:extLst>
+              <a:ext uri="{28A0092B-C50C-407E-A947-70E740481C1C}">
+                <a14:useLocalDpi xmlns:a14="http://schemas.microsoft.com/office/drawing/2010/main" val="0"/>
+              </a:ext>
+            </a:extLst>
+          </a:blip>
+          <a:srcRect/>
+          <a:stretch>
+            <a:fillRect/>
+          </a:stretch>
+        </p:blipFill>
+        <p:spPr bwMode="auto">
+          <a:xfrm>
+            <a:off x="538951" y="2758651"/>
+            <a:ext cx="437403" cy="150699"/>
+          </a:xfrm>
+          <a:prstGeom prst="rect">
+            <a:avLst/>
+          </a:prstGeom>
+          <a:noFill/>
+          <a:extLst>
+            <a:ext uri="{909E8E84-426E-40DD-AFC4-6F175D3DCCD1}">
+              <a14:hiddenFill xmlns:a14="http://schemas.microsoft.com/office/drawing/2010/main">
+                <a:solidFill>
+                  <a:srgbClr val="FFFFFF"/>
+                </a:solidFill>
+              </a14:hiddenFill>
+            </a:ext>
+          </a:extLst>
+        </p:spPr>
+      </p:pic>
+      <p:pic>
+        <p:nvPicPr>
+          <p:cNvPr id="1034" name="Picture 10" descr="Power BI Datasets &amp; Services Simplified 101 - Learn | Hevo">
+            <a:extLst>
+              <a:ext uri="{FF2B5EF4-FFF2-40B4-BE49-F238E27FC236}">
+                <a16:creationId xmlns:a16="http://schemas.microsoft.com/office/drawing/2014/main" id="{CA7912BE-CACD-C366-6625-F1F40B7B6CFD}"/>
+              </a:ext>
+            </a:extLst>
+          </p:cNvPr>
+          <p:cNvPicPr>
+            <a:picLocks noChangeAspect="1" noChangeArrowheads="1"/>
+          </p:cNvPicPr>
+          <p:nvPr/>
+        </p:nvPicPr>
+        <p:blipFill>
+          <a:blip r:embed="rId8">
+            <a:extLst>
+              <a:ext uri="{28A0092B-C50C-407E-A947-70E740481C1C}">
+                <a14:useLocalDpi xmlns:a14="http://schemas.microsoft.com/office/drawing/2010/main" val="0"/>
+              </a:ext>
+            </a:extLst>
+          </a:blip>
+          <a:srcRect/>
+          <a:stretch>
+            <a:fillRect/>
+          </a:stretch>
+        </p:blipFill>
+        <p:spPr bwMode="auto">
+          <a:xfrm>
+            <a:off x="7354093" y="1845168"/>
+            <a:ext cx="515709" cy="238052"/>
+          </a:xfrm>
+          <a:prstGeom prst="rect">
+            <a:avLst/>
+          </a:prstGeom>
+          <a:noFill/>
+          <a:extLst>
+            <a:ext uri="{909E8E84-426E-40DD-AFC4-6F175D3DCCD1}">
+              <a14:hiddenFill xmlns:a14="http://schemas.microsoft.com/office/drawing/2010/main">
+                <a:solidFill>
+                  <a:srgbClr val="FFFFFF"/>
+                </a:solidFill>
+              </a14:hiddenFill>
+            </a:ext>
+          </a:extLst>
+        </p:spPr>
+      </p:pic>
+      <p:pic>
+        <p:nvPicPr>
+          <p:cNvPr id="13" name="Picture 2" descr="GMAOLinx Sphere | GMAO Linx | Software de Mantenimiento">
+            <a:extLst>
+              <a:ext uri="{FF2B5EF4-FFF2-40B4-BE49-F238E27FC236}">
+                <a16:creationId xmlns:a16="http://schemas.microsoft.com/office/drawing/2014/main" id="{FB839C2E-1F57-65C4-B81B-D6CC68EAE39C}"/>
+              </a:ext>
+            </a:extLst>
+          </p:cNvPr>
+          <p:cNvPicPr>
+            <a:picLocks noChangeAspect="1" noChangeArrowheads="1"/>
+          </p:cNvPicPr>
+          <p:nvPr/>
+        </p:nvPicPr>
+        <p:blipFill rotWithShape="1">
+          <a:blip r:embed="rId9">
+            <a:extLst>
+              <a:ext uri="{28A0092B-C50C-407E-A947-70E740481C1C}">
+                <a14:useLocalDpi xmlns:a14="http://schemas.microsoft.com/office/drawing/2010/main" val="0"/>
+              </a:ext>
+            </a:extLst>
+          </a:blip>
+          <a:srcRect l="-1" r="44433"/>
+          <a:stretch/>
+        </p:blipFill>
+        <p:spPr bwMode="auto">
+          <a:xfrm>
+            <a:off x="7466383" y="2864136"/>
+            <a:ext cx="382337" cy="172016"/>
+          </a:xfrm>
+          <a:prstGeom prst="rect">
+            <a:avLst/>
+          </a:prstGeom>
+          <a:noFill/>
+          <a:extLst>
+            <a:ext uri="{909E8E84-426E-40DD-AFC4-6F175D3DCCD1}">
+              <a14:hiddenFill xmlns:a14="http://schemas.microsoft.com/office/drawing/2010/main">
+                <a:solidFill>
+                  <a:srgbClr val="FFFFFF"/>
+                </a:solidFill>
+              </a14:hiddenFill>
+            </a:ext>
+          </a:extLst>
+        </p:spPr>
+      </p:pic>
+      <p:sp>
+        <p:nvSpPr>
+          <p:cNvPr id="51" name="CuadroTexto 50">
+            <a:extLst>
+              <a:ext uri="{FF2B5EF4-FFF2-40B4-BE49-F238E27FC236}">
+                <a16:creationId xmlns:a16="http://schemas.microsoft.com/office/drawing/2014/main" id="{69CC83AF-60E1-C00B-D63B-4F44BD5E268A}"/>
+              </a:ext>
+            </a:extLst>
+          </p:cNvPr>
+          <p:cNvSpPr txBox="1"/>
+          <p:nvPr/>
+        </p:nvSpPr>
+        <p:spPr>
+          <a:xfrm>
+            <a:off x="2911858" y="1217007"/>
+            <a:ext cx="1084991" cy="369332"/>
+          </a:xfrm>
+          <a:prstGeom prst="rect">
+            <a:avLst/>
+          </a:prstGeom>
+          <a:noFill/>
+        </p:spPr>
+        <p:txBody>
+          <a:bodyPr wrap="square" rtlCol="0">
+            <a:spAutoFit/>
+          </a:bodyPr>
+          <a:lstStyle/>
+          <a:p>
+            <a:r>
+              <a:rPr lang="es-ES" sz="1000" b="1" dirty="0">
+                <a:solidFill>
+                  <a:schemeClr val="bg1"/>
+                </a:solidFill>
+              </a:rPr>
+              <a:t>WooCommerce</a:t>
+            </a:r>
+          </a:p>
+          <a:p>
+            <a:r>
+              <a:rPr lang="es-ES" sz="800" dirty="0">
+                <a:solidFill>
+                  <a:srgbClr val="CC99FF"/>
+                </a:solidFill>
+              </a:rPr>
+              <a:t>Click see more</a:t>
+            </a:r>
+          </a:p>
+        </p:txBody>
+      </p:sp>
       <p:cxnSp>
         <p:nvCxnSpPr>
-          <p:cNvPr id="22" name="Conector recto de flecha 21">
-            <a:extLst>
-              <a:ext uri="{FF2B5EF4-FFF2-40B4-BE49-F238E27FC236}">
-                <a16:creationId xmlns:a16="http://schemas.microsoft.com/office/drawing/2014/main" id="{A6BAB5B2-2CF8-E383-3ACB-1821932A0CDD}"/>
+          <p:cNvPr id="54" name="Conector recto de flecha 53">
+            <a:extLst>
+              <a:ext uri="{FF2B5EF4-FFF2-40B4-BE49-F238E27FC236}">
+                <a16:creationId xmlns:a16="http://schemas.microsoft.com/office/drawing/2014/main" id="{E9FC2E46-FA03-767F-2726-8E55595C483F}"/>
               </a:ext>
             </a:extLst>
           </p:cNvPr>
@@ -4088,13 +4730,13 @@
         </p:nvCxnSpPr>
         <p:spPr>
           <a:xfrm>
-            <a:off x="4546758" y="1592290"/>
-            <a:ext cx="429209" cy="0"/>
+            <a:off x="2122035" y="2253988"/>
+            <a:ext cx="669313" cy="0"/>
           </a:xfrm>
           <a:prstGeom prst="straightConnector1">
             <a:avLst/>
           </a:prstGeom>
-          <a:ln w="28575">
+          <a:ln w="19050">
             <a:solidFill>
               <a:schemeClr val="tx1">
                 <a:lumMod val="75000"/>
@@ -4121,10 +4763,10 @@
       </p:cxnSp>
       <p:cxnSp>
         <p:nvCxnSpPr>
-          <p:cNvPr id="23" name="Conector recto de flecha 22">
-            <a:extLst>
-              <a:ext uri="{FF2B5EF4-FFF2-40B4-BE49-F238E27FC236}">
-                <a16:creationId xmlns:a16="http://schemas.microsoft.com/office/drawing/2014/main" id="{FABCC903-A83B-758E-681E-772CD513FE2D}"/>
+          <p:cNvPr id="55" name="Conector recto de flecha 54">
+            <a:extLst>
+              <a:ext uri="{FF2B5EF4-FFF2-40B4-BE49-F238E27FC236}">
+                <a16:creationId xmlns:a16="http://schemas.microsoft.com/office/drawing/2014/main" id="{7E65160A-9404-627F-8727-24CCA5C12D8A}"/>
               </a:ext>
             </a:extLst>
           </p:cNvPr>
@@ -4135,13 +4777,13 @@
         </p:nvCxnSpPr>
         <p:spPr>
           <a:xfrm flipH="1">
-            <a:off x="4531207" y="1730789"/>
-            <a:ext cx="444760" cy="0"/>
+            <a:off x="2009722" y="2365225"/>
+            <a:ext cx="640633" cy="0"/>
           </a:xfrm>
           <a:prstGeom prst="straightConnector1">
             <a:avLst/>
           </a:prstGeom>
-          <a:ln w="28575">
+          <a:ln w="19050">
             <a:solidFill>
               <a:schemeClr val="tx1">
                 <a:lumMod val="75000"/>
@@ -4168,10 +4810,10 @@
       </p:cxnSp>
       <p:sp>
         <p:nvSpPr>
-          <p:cNvPr id="24" name="CuadroTexto 23">
-            <a:extLst>
-              <a:ext uri="{FF2B5EF4-FFF2-40B4-BE49-F238E27FC236}">
-                <a16:creationId xmlns:a16="http://schemas.microsoft.com/office/drawing/2014/main" id="{384A7596-EC8E-F128-ADFD-1ACAE86E826B}"/>
+          <p:cNvPr id="56" name="CuadroTexto 55">
+            <a:extLst>
+              <a:ext uri="{FF2B5EF4-FFF2-40B4-BE49-F238E27FC236}">
+                <a16:creationId xmlns:a16="http://schemas.microsoft.com/office/drawing/2014/main" id="{9A05D115-8CD8-A76C-5F7F-0BD3F19FCCD7}"/>
               </a:ext>
             </a:extLst>
           </p:cNvPr>
@@ -4180,8 +4822,8 @@
         </p:nvSpPr>
         <p:spPr>
           <a:xfrm>
-            <a:off x="4546758" y="1285841"/>
-            <a:ext cx="510075" cy="276998"/>
+            <a:off x="1954724" y="1822450"/>
+            <a:ext cx="979909" cy="369332"/>
           </a:xfrm>
           <a:prstGeom prst="rect">
             <a:avLst/>
@@ -4195,7 +4837,7 @@
           <a:lstStyle/>
           <a:p>
             <a:r>
-              <a:rPr lang="es-ES" sz="1200" b="1" dirty="0">
+              <a:rPr lang="es-ES" sz="1000" b="1" dirty="0">
                 <a:solidFill>
                   <a:schemeClr val="bg1"/>
                 </a:solidFill>
@@ -4203,14 +4845,176 @@
               <a:t>API</a:t>
             </a:r>
           </a:p>
-        </p:txBody>
-      </p:sp>
-      <p:sp>
-        <p:nvSpPr>
-          <p:cNvPr id="25" name="Rectángulo 24">
-            <a:extLst>
-              <a:ext uri="{FF2B5EF4-FFF2-40B4-BE49-F238E27FC236}">
-                <a16:creationId xmlns:a16="http://schemas.microsoft.com/office/drawing/2014/main" id="{F11E8DC9-7C2A-1A9C-8A17-7CA8153E4E2D}"/>
+          <a:p>
+            <a:r>
+              <a:rPr lang="es-ES" sz="800" dirty="0">
+                <a:solidFill>
+                  <a:srgbClr val="CC99FF"/>
+                </a:solidFill>
+              </a:rPr>
+              <a:t>Click see more</a:t>
+            </a:r>
+          </a:p>
+        </p:txBody>
+      </p:sp>
+      <p:sp>
+        <p:nvSpPr>
+          <p:cNvPr id="57" name="CuadroTexto 56">
+            <a:extLst>
+              <a:ext uri="{FF2B5EF4-FFF2-40B4-BE49-F238E27FC236}">
+                <a16:creationId xmlns:a16="http://schemas.microsoft.com/office/drawing/2014/main" id="{0EA8C362-4A98-2BD9-038B-0C5571AB24DF}"/>
+              </a:ext>
+            </a:extLst>
+          </p:cNvPr>
+          <p:cNvSpPr txBox="1"/>
+          <p:nvPr/>
+        </p:nvSpPr>
+        <p:spPr>
+          <a:xfrm>
+            <a:off x="452784" y="2053750"/>
+            <a:ext cx="1084991" cy="369332"/>
+          </a:xfrm>
+          <a:prstGeom prst="rect">
+            <a:avLst/>
+          </a:prstGeom>
+          <a:noFill/>
+        </p:spPr>
+        <p:txBody>
+          <a:bodyPr wrap="square" rtlCol="0">
+            <a:spAutoFit/>
+          </a:bodyPr>
+          <a:lstStyle/>
+          <a:p>
+            <a:r>
+              <a:rPr lang="es-ES" sz="1000" b="1" dirty="0">
+                <a:solidFill>
+                  <a:schemeClr val="bg1"/>
+                </a:solidFill>
+              </a:rPr>
+              <a:t>Sendcloud</a:t>
+            </a:r>
+          </a:p>
+          <a:p>
+            <a:r>
+              <a:rPr lang="es-ES" sz="800" dirty="0">
+                <a:solidFill>
+                  <a:srgbClr val="CC99FF"/>
+                </a:solidFill>
+              </a:rPr>
+              <a:t>Click see more</a:t>
+            </a:r>
+          </a:p>
+        </p:txBody>
+      </p:sp>
+      <p:sp>
+        <p:nvSpPr>
+          <p:cNvPr id="58" name="CuadroTexto 57">
+            <a:extLst>
+              <a:ext uri="{FF2B5EF4-FFF2-40B4-BE49-F238E27FC236}">
+                <a16:creationId xmlns:a16="http://schemas.microsoft.com/office/drawing/2014/main" id="{30DB07AD-510E-D712-584B-4334558ADC8F}"/>
+              </a:ext>
+            </a:extLst>
+          </p:cNvPr>
+          <p:cNvSpPr txBox="1"/>
+          <p:nvPr/>
+        </p:nvSpPr>
+        <p:spPr>
+          <a:xfrm>
+            <a:off x="5051918" y="1224879"/>
+            <a:ext cx="1084991" cy="369332"/>
+          </a:xfrm>
+          <a:prstGeom prst="rect">
+            <a:avLst/>
+          </a:prstGeom>
+          <a:noFill/>
+        </p:spPr>
+        <p:txBody>
+          <a:bodyPr wrap="square" rtlCol="0">
+            <a:spAutoFit/>
+          </a:bodyPr>
+          <a:lstStyle/>
+          <a:p>
+            <a:r>
+              <a:rPr lang="es-ES" sz="1000" b="1" dirty="0">
+                <a:solidFill>
+                  <a:schemeClr val="bg1"/>
+                </a:solidFill>
+              </a:rPr>
+              <a:t>Sage</a:t>
+            </a:r>
+          </a:p>
+          <a:p>
+            <a:r>
+              <a:rPr lang="es-ES" sz="800" dirty="0">
+                <a:solidFill>
+                  <a:srgbClr val="CC99FF"/>
+                </a:solidFill>
+              </a:rPr>
+              <a:t>Click see more</a:t>
+            </a:r>
+          </a:p>
+        </p:txBody>
+      </p:sp>
+      <p:sp>
+        <p:nvSpPr>
+          <p:cNvPr id="62" name="CuadroTexto 61">
+            <a:extLst>
+              <a:ext uri="{FF2B5EF4-FFF2-40B4-BE49-F238E27FC236}">
+                <a16:creationId xmlns:a16="http://schemas.microsoft.com/office/drawing/2014/main" id="{D88BEE17-809C-5172-AD92-D6973F499E0A}"/>
+              </a:ext>
+            </a:extLst>
+          </p:cNvPr>
+          <p:cNvSpPr txBox="1"/>
+          <p:nvPr/>
+        </p:nvSpPr>
+        <p:spPr>
+          <a:xfrm>
+            <a:off x="467106" y="3887532"/>
+            <a:ext cx="1084991" cy="369332"/>
+          </a:xfrm>
+          <a:prstGeom prst="rect">
+            <a:avLst/>
+          </a:prstGeom>
+          <a:noFill/>
+        </p:spPr>
+        <p:txBody>
+          <a:bodyPr wrap="square" rtlCol="0">
+            <a:spAutoFit/>
+          </a:bodyPr>
+          <a:lstStyle/>
+          <a:p>
+            <a:r>
+              <a:rPr lang="es-ES" sz="1000" b="1" dirty="0" err="1">
+                <a:solidFill>
+                  <a:schemeClr val="bg1"/>
+                </a:solidFill>
+              </a:rPr>
+              <a:t>Clarity</a:t>
+            </a:r>
+            <a:endParaRPr lang="es-ES" sz="1000" b="1" dirty="0">
+              <a:solidFill>
+                <a:schemeClr val="bg1"/>
+              </a:solidFill>
+            </a:endParaRPr>
+          </a:p>
+          <a:p>
+            <a:r>
+              <a:rPr lang="es-ES" sz="800" dirty="0">
+                <a:solidFill>
+                  <a:srgbClr val="CC99FF"/>
+                </a:solidFill>
+              </a:rPr>
+              <a:t>Click see more</a:t>
+            </a:r>
+          </a:p>
+        </p:txBody>
+      </p:sp>
+      <p:sp>
+        <p:nvSpPr>
+          <p:cNvPr id="63" name="Rectángulo 62">
+            <a:extLst>
+              <a:ext uri="{FF2B5EF4-FFF2-40B4-BE49-F238E27FC236}">
+                <a16:creationId xmlns:a16="http://schemas.microsoft.com/office/drawing/2014/main" id="{0D60BED8-9ABD-3471-825A-2044FA4E5EEB}"/>
               </a:ext>
             </a:extLst>
           </p:cNvPr>
@@ -4219,8 +5023,8 @@
         </p:nvSpPr>
         <p:spPr>
           <a:xfrm>
-            <a:off x="158619" y="295469"/>
-            <a:ext cx="1763487" cy="867802"/>
+            <a:off x="431227" y="4489100"/>
+            <a:ext cx="1470659" cy="846100"/>
           </a:xfrm>
           <a:prstGeom prst="rect">
             <a:avLst/>
@@ -4262,10 +5066,10 @@
       </p:sp>
       <p:sp>
         <p:nvSpPr>
-          <p:cNvPr id="26" name="CuadroTexto 25">
-            <a:extLst>
-              <a:ext uri="{FF2B5EF4-FFF2-40B4-BE49-F238E27FC236}">
-                <a16:creationId xmlns:a16="http://schemas.microsoft.com/office/drawing/2014/main" id="{34BBA5FE-81A5-8891-A0A3-6D86437F7412}"/>
+          <p:cNvPr id="1024" name="CuadroTexto 1023">
+            <a:extLst>
+              <a:ext uri="{FF2B5EF4-FFF2-40B4-BE49-F238E27FC236}">
+                <a16:creationId xmlns:a16="http://schemas.microsoft.com/office/drawing/2014/main" id="{2509BF2F-448E-26EF-BECC-89FE12B9F64B}"/>
               </a:ext>
             </a:extLst>
           </p:cNvPr>
@@ -4274,8 +5078,8 @@
         </p:nvSpPr>
         <p:spPr>
           <a:xfrm>
-            <a:off x="223935" y="738673"/>
-            <a:ext cx="1614196" cy="276999"/>
+            <a:off x="480219" y="4803818"/>
+            <a:ext cx="1084991" cy="523220"/>
           </a:xfrm>
           <a:prstGeom prst="rect">
             <a:avLst/>
@@ -4289,27 +5093,32 @@
           <a:lstStyle/>
           <a:p>
             <a:r>
-              <a:rPr lang="es-ES" sz="1200" b="1" dirty="0" err="1">
+              <a:rPr lang="es-ES" sz="1000" b="1" dirty="0">
                 <a:solidFill>
                   <a:schemeClr val="bg1"/>
                 </a:solidFill>
               </a:rPr>
-              <a:t>Ticketing</a:t>
-            </a:r>
-            <a:endParaRPr lang="es-ES" sz="1200" b="1" dirty="0">
-              <a:solidFill>
-                <a:schemeClr val="bg1"/>
-              </a:solidFill>
-            </a:endParaRPr>
+              <a:t>Google Merchant Center</a:t>
+            </a:r>
+          </a:p>
+          <a:p>
+            <a:r>
+              <a:rPr lang="es-ES" sz="800" dirty="0">
+                <a:solidFill>
+                  <a:srgbClr val="CC99FF"/>
+                </a:solidFill>
+              </a:rPr>
+              <a:t>Click see more</a:t>
+            </a:r>
           </a:p>
         </p:txBody>
       </p:sp>
       <p:pic>
         <p:nvPicPr>
-          <p:cNvPr id="1032" name="Picture 8" descr="Customer Service Software To Grow Your Business | Tidio">
-            <a:extLst>
-              <a:ext uri="{FF2B5EF4-FFF2-40B4-BE49-F238E27FC236}">
-                <a16:creationId xmlns:a16="http://schemas.microsoft.com/office/drawing/2014/main" id="{E4AFC14D-985B-5EE5-0814-153D80733CEA}"/>
+          <p:cNvPr id="1025" name="Picture 2">
+            <a:extLst>
+              <a:ext uri="{FF2B5EF4-FFF2-40B4-BE49-F238E27FC236}">
+                <a16:creationId xmlns:a16="http://schemas.microsoft.com/office/drawing/2014/main" id="{6F9E4D59-A02B-76AD-3DB6-0DCFB8B49F45}"/>
               </a:ext>
             </a:extLst>
           </p:cNvPr>
@@ -4319,7 +5128,7 @@
           <p:nvPr/>
         </p:nvPicPr>
         <p:blipFill>
-          <a:blip r:embed="rId6">
+          <a:blip r:embed="rId10">
             <a:extLst>
               <a:ext uri="{28A0092B-C50C-407E-A947-70E740481C1C}">
                 <a14:useLocalDpi xmlns:a14="http://schemas.microsoft.com/office/drawing/2010/main" val="0"/>
@@ -4333,8 +5142,8 @@
         </p:blipFill>
         <p:spPr bwMode="auto">
           <a:xfrm>
-            <a:off x="278558" y="376894"/>
-            <a:ext cx="752475" cy="342750"/>
+            <a:off x="538951" y="3657181"/>
+            <a:ext cx="188439" cy="188439"/>
           </a:xfrm>
           <a:prstGeom prst="rect">
             <a:avLst/>
@@ -4351,111 +5160,104 @@
           </a:extLst>
         </p:spPr>
       </p:pic>
-      <p:sp>
-        <p:nvSpPr>
-          <p:cNvPr id="28" name="CuadroTexto 27">
-            <a:extLst>
-              <a:ext uri="{FF2B5EF4-FFF2-40B4-BE49-F238E27FC236}">
-                <a16:creationId xmlns:a16="http://schemas.microsoft.com/office/drawing/2014/main" id="{BD1B8068-B69A-1124-6A47-8551D9C55B65}"/>
-              </a:ext>
-            </a:extLst>
-          </p:cNvPr>
-          <p:cNvSpPr txBox="1"/>
-          <p:nvPr/>
-        </p:nvSpPr>
-        <p:spPr>
-          <a:xfrm>
-            <a:off x="205371" y="1687430"/>
-            <a:ext cx="1632760" cy="276999"/>
+      <p:pic>
+        <p:nvPicPr>
+          <p:cNvPr id="1027" name="Picture 4" descr="Google Merchant Center Logo PNG Vector (SVG) Free Download">
+            <a:extLst>
+              <a:ext uri="{FF2B5EF4-FFF2-40B4-BE49-F238E27FC236}">
+                <a16:creationId xmlns:a16="http://schemas.microsoft.com/office/drawing/2014/main" id="{6E6E118E-A909-3C96-8ACA-0B98BEBEA4EA}"/>
+              </a:ext>
+            </a:extLst>
+          </p:cNvPr>
+          <p:cNvPicPr>
+            <a:picLocks noChangeAspect="1" noChangeArrowheads="1"/>
+          </p:cNvPicPr>
+          <p:nvPr/>
+        </p:nvPicPr>
+        <p:blipFill>
+          <a:blip r:embed="rId11">
+            <a:extLst>
+              <a:ext uri="{28A0092B-C50C-407E-A947-70E740481C1C}">
+                <a14:useLocalDpi xmlns:a14="http://schemas.microsoft.com/office/drawing/2010/main" val="0"/>
+              </a:ext>
+            </a:extLst>
+          </a:blip>
+          <a:srcRect/>
+          <a:stretch>
+            <a:fillRect/>
+          </a:stretch>
+        </p:blipFill>
+        <p:spPr bwMode="auto">
+          <a:xfrm>
+            <a:off x="546965" y="4571662"/>
+            <a:ext cx="212575" cy="212575"/>
           </a:xfrm>
           <a:prstGeom prst="rect">
             <a:avLst/>
           </a:prstGeom>
           <a:noFill/>
-        </p:spPr>
-        <p:txBody>
-          <a:bodyPr wrap="square" rtlCol="0">
-            <a:spAutoFit/>
-          </a:bodyPr>
-          <a:lstStyle/>
-          <a:p>
-            <a:r>
-              <a:rPr lang="es-ES" sz="1200" b="1" dirty="0" err="1">
-                <a:solidFill>
-                  <a:schemeClr val="bg1"/>
-                </a:solidFill>
-              </a:rPr>
-              <a:t>Ticketing</a:t>
-            </a:r>
-            <a:endParaRPr lang="es-ES" sz="1200" b="1" dirty="0">
-              <a:solidFill>
-                <a:schemeClr val="bg1"/>
-              </a:solidFill>
-            </a:endParaRPr>
-          </a:p>
-        </p:txBody>
-      </p:sp>
-      <p:sp>
-        <p:nvSpPr>
-          <p:cNvPr id="30" name="Rectángulo 29">
-            <a:extLst>
-              <a:ext uri="{FF2B5EF4-FFF2-40B4-BE49-F238E27FC236}">
-                <a16:creationId xmlns:a16="http://schemas.microsoft.com/office/drawing/2014/main" id="{023F81EE-107E-8FA7-B5DD-F2D70611938D}"/>
-              </a:ext>
-            </a:extLst>
-          </p:cNvPr>
-          <p:cNvSpPr/>
-          <p:nvPr/>
-        </p:nvSpPr>
-        <p:spPr>
-          <a:xfrm>
-            <a:off x="158620" y="2205988"/>
-            <a:ext cx="1763487" cy="677171"/>
+          <a:extLst>
+            <a:ext uri="{909E8E84-426E-40DD-AFC4-6F175D3DCCD1}">
+              <a14:hiddenFill xmlns:a14="http://schemas.microsoft.com/office/drawing/2010/main">
+                <a:solidFill>
+                  <a:srgbClr val="FFFFFF"/>
+                </a:solidFill>
+              </a14:hiddenFill>
+            </a:ext>
+          </a:extLst>
+        </p:spPr>
+      </p:pic>
+      <p:pic>
+        <p:nvPicPr>
+          <p:cNvPr id="1029" name="Picture 6" descr="Google Search Console">
+            <a:extLst>
+              <a:ext uri="{FF2B5EF4-FFF2-40B4-BE49-F238E27FC236}">
+                <a16:creationId xmlns:a16="http://schemas.microsoft.com/office/drawing/2014/main" id="{D1A74204-F8F4-FBBF-32D3-50541113F65A}"/>
+              </a:ext>
+            </a:extLst>
+          </p:cNvPr>
+          <p:cNvPicPr>
+            <a:picLocks noChangeAspect="1" noChangeArrowheads="1"/>
+          </p:cNvPicPr>
+          <p:nvPr/>
+        </p:nvPicPr>
+        <p:blipFill rotWithShape="1">
+          <a:blip r:embed="rId12">
+            <a:extLst>
+              <a:ext uri="{28A0092B-C50C-407E-A947-70E740481C1C}">
+                <a14:useLocalDpi xmlns:a14="http://schemas.microsoft.com/office/drawing/2010/main" val="0"/>
+              </a:ext>
+            </a:extLst>
+          </a:blip>
+          <a:srcRect t="17266" b="19951"/>
+          <a:stretch/>
+        </p:blipFill>
+        <p:spPr bwMode="auto">
+          <a:xfrm>
+            <a:off x="537833" y="5477084"/>
+            <a:ext cx="439637" cy="276016"/>
           </a:xfrm>
           <a:prstGeom prst="rect">
             <a:avLst/>
           </a:prstGeom>
-          <a:solidFill>
-            <a:schemeClr val="tx1">
-              <a:lumMod val="75000"/>
-              <a:lumOff val="25000"/>
-            </a:schemeClr>
-          </a:solidFill>
-          <a:ln>
-            <a:noFill/>
-          </a:ln>
-        </p:spPr>
-        <p:style>
-          <a:lnRef idx="2">
-            <a:schemeClr val="accent1">
-              <a:shade val="15000"/>
-            </a:schemeClr>
-          </a:lnRef>
-          <a:fillRef idx="1">
-            <a:schemeClr val="accent1"/>
-          </a:fillRef>
-          <a:effectRef idx="0">
-            <a:schemeClr val="accent1"/>
-          </a:effectRef>
-          <a:fontRef idx="minor">
-            <a:schemeClr val="lt1"/>
-          </a:fontRef>
-        </p:style>
-        <p:txBody>
-          <a:bodyPr rtlCol="0" anchor="ctr"/>
-          <a:lstStyle/>
-          <a:p>
-            <a:pPr algn="ctr"/>
-            <a:endParaRPr lang="es-ES"/>
-          </a:p>
-        </p:txBody>
-      </p:sp>
+          <a:noFill/>
+          <a:extLst>
+            <a:ext uri="{909E8E84-426E-40DD-AFC4-6F175D3DCCD1}">
+              <a14:hiddenFill xmlns:a14="http://schemas.microsoft.com/office/drawing/2010/main">
+                <a:solidFill>
+                  <a:srgbClr val="FFFFFF"/>
+                </a:solidFill>
+              </a14:hiddenFill>
+            </a:ext>
+          </a:extLst>
+        </p:spPr>
+      </p:pic>
       <p:cxnSp>
         <p:nvCxnSpPr>
-          <p:cNvPr id="36" name="Conector recto de flecha 35">
-            <a:extLst>
-              <a:ext uri="{FF2B5EF4-FFF2-40B4-BE49-F238E27FC236}">
-                <a16:creationId xmlns:a16="http://schemas.microsoft.com/office/drawing/2014/main" id="{EB24CBE4-360E-128B-F39A-6FFFA71E5549}"/>
+          <p:cNvPr id="1035" name="Conector recto de flecha 1034">
+            <a:extLst>
+              <a:ext uri="{FF2B5EF4-FFF2-40B4-BE49-F238E27FC236}">
+                <a16:creationId xmlns:a16="http://schemas.microsoft.com/office/drawing/2014/main" id="{3E795549-BB41-ECCF-C9E2-8BF9BD3B4107}"/>
               </a:ext>
             </a:extLst>
           </p:cNvPr>
@@ -4466,13 +5268,13 @@
         </p:nvCxnSpPr>
         <p:spPr>
           <a:xfrm>
-            <a:off x="4569485" y="715757"/>
-            <a:ext cx="429209" cy="0"/>
+            <a:off x="2090754" y="3149974"/>
+            <a:ext cx="669313" cy="0"/>
           </a:xfrm>
           <a:prstGeom prst="straightConnector1">
             <a:avLst/>
           </a:prstGeom>
-          <a:ln w="28575">
+          <a:ln w="19050">
             <a:solidFill>
               <a:schemeClr val="tx1">
                 <a:lumMod val="75000"/>
@@ -4499,10 +5301,10 @@
       </p:cxnSp>
       <p:cxnSp>
         <p:nvCxnSpPr>
-          <p:cNvPr id="37" name="Conector recto de flecha 36">
-            <a:extLst>
-              <a:ext uri="{FF2B5EF4-FFF2-40B4-BE49-F238E27FC236}">
-                <a16:creationId xmlns:a16="http://schemas.microsoft.com/office/drawing/2014/main" id="{4013A175-074C-6A54-EB96-F0AC1DF53B49}"/>
+          <p:cNvPr id="1037" name="Conector recto de flecha 1036">
+            <a:extLst>
+              <a:ext uri="{FF2B5EF4-FFF2-40B4-BE49-F238E27FC236}">
+                <a16:creationId xmlns:a16="http://schemas.microsoft.com/office/drawing/2014/main" id="{0DD61B54-FAF0-FA73-A0C5-236156330828}"/>
               </a:ext>
             </a:extLst>
           </p:cNvPr>
@@ -4513,13 +5315,13 @@
         </p:nvCxnSpPr>
         <p:spPr>
           <a:xfrm flipH="1">
-            <a:off x="4553934" y="854256"/>
-            <a:ext cx="444760" cy="0"/>
+            <a:off x="1978441" y="3261211"/>
+            <a:ext cx="640633" cy="0"/>
           </a:xfrm>
           <a:prstGeom prst="straightConnector1">
             <a:avLst/>
           </a:prstGeom>
-          <a:ln w="28575">
+          <a:ln w="19050">
             <a:solidFill>
               <a:schemeClr val="tx1">
                 <a:lumMod val="75000"/>
@@ -4546,10 +5348,10 @@
       </p:cxnSp>
       <p:sp>
         <p:nvSpPr>
-          <p:cNvPr id="38" name="CuadroTexto 37">
-            <a:extLst>
-              <a:ext uri="{FF2B5EF4-FFF2-40B4-BE49-F238E27FC236}">
-                <a16:creationId xmlns:a16="http://schemas.microsoft.com/office/drawing/2014/main" id="{B5D521F6-23BD-8409-EA1B-3BC0445B0C55}"/>
+          <p:cNvPr id="1038" name="CuadroTexto 1037">
+            <a:extLst>
+              <a:ext uri="{FF2B5EF4-FFF2-40B4-BE49-F238E27FC236}">
+                <a16:creationId xmlns:a16="http://schemas.microsoft.com/office/drawing/2014/main" id="{FF009962-4B96-A836-B658-BD1DDD60362B}"/>
               </a:ext>
             </a:extLst>
           </p:cNvPr>
@@ -4558,8 +5360,8 @@
         </p:nvSpPr>
         <p:spPr>
           <a:xfrm>
-            <a:off x="4569485" y="409308"/>
-            <a:ext cx="510075" cy="276998"/>
+            <a:off x="1923443" y="2718436"/>
+            <a:ext cx="979909" cy="369332"/>
           </a:xfrm>
           <a:prstGeom prst="rect">
             <a:avLst/>
@@ -4573,7 +5375,7 @@
           <a:lstStyle/>
           <a:p>
             <a:r>
-              <a:rPr lang="es-ES" sz="1200" b="1" dirty="0">
+              <a:rPr lang="es-ES" sz="1000" b="1" dirty="0">
                 <a:solidFill>
                   <a:schemeClr val="bg1"/>
                 </a:solidFill>
@@ -4581,8 +5383,1293 @@
               <a:t>API</a:t>
             </a:r>
           </a:p>
-        </p:txBody>
-      </p:sp>
+          <a:p>
+            <a:r>
+              <a:rPr lang="es-ES" sz="800" dirty="0">
+                <a:solidFill>
+                  <a:srgbClr val="CC99FF"/>
+                </a:solidFill>
+              </a:rPr>
+              <a:t>Click see more</a:t>
+            </a:r>
+          </a:p>
+        </p:txBody>
+      </p:sp>
+      <p:cxnSp>
+        <p:nvCxnSpPr>
+          <p:cNvPr id="1039" name="Conector recto de flecha 1038">
+            <a:extLst>
+              <a:ext uri="{FF2B5EF4-FFF2-40B4-BE49-F238E27FC236}">
+                <a16:creationId xmlns:a16="http://schemas.microsoft.com/office/drawing/2014/main" id="{81DC3F93-9B0F-908F-46D7-52D9975F7F47}"/>
+              </a:ext>
+            </a:extLst>
+          </p:cNvPr>
+          <p:cNvCxnSpPr>
+            <a:cxnSpLocks/>
+          </p:cNvCxnSpPr>
+          <p:nvPr/>
+        </p:nvCxnSpPr>
+        <p:spPr>
+          <a:xfrm>
+            <a:off x="2145752" y="4109813"/>
+            <a:ext cx="669313" cy="0"/>
+          </a:xfrm>
+          <a:prstGeom prst="straightConnector1">
+            <a:avLst/>
+          </a:prstGeom>
+          <a:ln w="19050">
+            <a:solidFill>
+              <a:schemeClr val="tx1">
+                <a:lumMod val="75000"/>
+                <a:lumOff val="25000"/>
+              </a:schemeClr>
+            </a:solidFill>
+            <a:tailEnd type="triangle"/>
+          </a:ln>
+        </p:spPr>
+        <p:style>
+          <a:lnRef idx="1">
+            <a:schemeClr val="accent1"/>
+          </a:lnRef>
+          <a:fillRef idx="0">
+            <a:schemeClr val="accent1"/>
+          </a:fillRef>
+          <a:effectRef idx="0">
+            <a:schemeClr val="accent1"/>
+          </a:effectRef>
+          <a:fontRef idx="minor">
+            <a:schemeClr val="tx1"/>
+          </a:fontRef>
+        </p:style>
+      </p:cxnSp>
+      <p:cxnSp>
+        <p:nvCxnSpPr>
+          <p:cNvPr id="1040" name="Conector recto de flecha 1039">
+            <a:extLst>
+              <a:ext uri="{FF2B5EF4-FFF2-40B4-BE49-F238E27FC236}">
+                <a16:creationId xmlns:a16="http://schemas.microsoft.com/office/drawing/2014/main" id="{E365D988-2B33-506E-D3EF-CB9435CF51C6}"/>
+              </a:ext>
+            </a:extLst>
+          </p:cNvPr>
+          <p:cNvCxnSpPr>
+            <a:cxnSpLocks/>
+          </p:cNvCxnSpPr>
+          <p:nvPr/>
+        </p:nvCxnSpPr>
+        <p:spPr>
+          <a:xfrm flipH="1">
+            <a:off x="2033439" y="4221050"/>
+            <a:ext cx="640633" cy="0"/>
+          </a:xfrm>
+          <a:prstGeom prst="straightConnector1">
+            <a:avLst/>
+          </a:prstGeom>
+          <a:ln w="19050">
+            <a:solidFill>
+              <a:schemeClr val="tx1">
+                <a:lumMod val="75000"/>
+                <a:lumOff val="25000"/>
+              </a:schemeClr>
+            </a:solidFill>
+            <a:tailEnd type="triangle"/>
+          </a:ln>
+        </p:spPr>
+        <p:style>
+          <a:lnRef idx="1">
+            <a:schemeClr val="accent1"/>
+          </a:lnRef>
+          <a:fillRef idx="0">
+            <a:schemeClr val="accent1"/>
+          </a:fillRef>
+          <a:effectRef idx="0">
+            <a:schemeClr val="accent1"/>
+          </a:effectRef>
+          <a:fontRef idx="minor">
+            <a:schemeClr val="tx1"/>
+          </a:fontRef>
+        </p:style>
+      </p:cxnSp>
+      <p:sp>
+        <p:nvSpPr>
+          <p:cNvPr id="1041" name="CuadroTexto 1040">
+            <a:extLst>
+              <a:ext uri="{FF2B5EF4-FFF2-40B4-BE49-F238E27FC236}">
+                <a16:creationId xmlns:a16="http://schemas.microsoft.com/office/drawing/2014/main" id="{C2943953-966A-BA02-D4A6-7533A50C99ED}"/>
+              </a:ext>
+            </a:extLst>
+          </p:cNvPr>
+          <p:cNvSpPr txBox="1"/>
+          <p:nvPr/>
+        </p:nvSpPr>
+        <p:spPr>
+          <a:xfrm>
+            <a:off x="1978441" y="3678275"/>
+            <a:ext cx="979909" cy="369332"/>
+          </a:xfrm>
+          <a:prstGeom prst="rect">
+            <a:avLst/>
+          </a:prstGeom>
+          <a:noFill/>
+        </p:spPr>
+        <p:txBody>
+          <a:bodyPr wrap="square" rtlCol="0">
+            <a:spAutoFit/>
+          </a:bodyPr>
+          <a:lstStyle/>
+          <a:p>
+            <a:r>
+              <a:rPr lang="es-ES" sz="1000" b="1" dirty="0">
+                <a:solidFill>
+                  <a:schemeClr val="bg1"/>
+                </a:solidFill>
+              </a:rPr>
+              <a:t>API</a:t>
+            </a:r>
+          </a:p>
+          <a:p>
+            <a:r>
+              <a:rPr lang="es-ES" sz="800" dirty="0">
+                <a:solidFill>
+                  <a:srgbClr val="CC99FF"/>
+                </a:solidFill>
+              </a:rPr>
+              <a:t>Click see more</a:t>
+            </a:r>
+          </a:p>
+        </p:txBody>
+      </p:sp>
+      <p:cxnSp>
+        <p:nvCxnSpPr>
+          <p:cNvPr id="1042" name="Conector recto de flecha 1041">
+            <a:extLst>
+              <a:ext uri="{FF2B5EF4-FFF2-40B4-BE49-F238E27FC236}">
+                <a16:creationId xmlns:a16="http://schemas.microsoft.com/office/drawing/2014/main" id="{B2175B7E-F18E-4A4E-EDA0-DCE2AA615C75}"/>
+              </a:ext>
+            </a:extLst>
+          </p:cNvPr>
+          <p:cNvCxnSpPr>
+            <a:cxnSpLocks/>
+          </p:cNvCxnSpPr>
+          <p:nvPr/>
+        </p:nvCxnSpPr>
+        <p:spPr>
+          <a:xfrm>
+            <a:off x="2115406" y="5031109"/>
+            <a:ext cx="669313" cy="0"/>
+          </a:xfrm>
+          <a:prstGeom prst="straightConnector1">
+            <a:avLst/>
+          </a:prstGeom>
+          <a:ln w="19050">
+            <a:solidFill>
+              <a:schemeClr val="tx1">
+                <a:lumMod val="75000"/>
+                <a:lumOff val="25000"/>
+              </a:schemeClr>
+            </a:solidFill>
+            <a:tailEnd type="triangle"/>
+          </a:ln>
+        </p:spPr>
+        <p:style>
+          <a:lnRef idx="1">
+            <a:schemeClr val="accent1"/>
+          </a:lnRef>
+          <a:fillRef idx="0">
+            <a:schemeClr val="accent1"/>
+          </a:fillRef>
+          <a:effectRef idx="0">
+            <a:schemeClr val="accent1"/>
+          </a:effectRef>
+          <a:fontRef idx="minor">
+            <a:schemeClr val="tx1"/>
+          </a:fontRef>
+        </p:style>
+      </p:cxnSp>
+      <p:cxnSp>
+        <p:nvCxnSpPr>
+          <p:cNvPr id="1043" name="Conector recto de flecha 1042">
+            <a:extLst>
+              <a:ext uri="{FF2B5EF4-FFF2-40B4-BE49-F238E27FC236}">
+                <a16:creationId xmlns:a16="http://schemas.microsoft.com/office/drawing/2014/main" id="{9665CBD8-1CAA-E638-3564-51002A38619E}"/>
+              </a:ext>
+            </a:extLst>
+          </p:cNvPr>
+          <p:cNvCxnSpPr>
+            <a:cxnSpLocks/>
+          </p:cNvCxnSpPr>
+          <p:nvPr/>
+        </p:nvCxnSpPr>
+        <p:spPr>
+          <a:xfrm flipH="1">
+            <a:off x="2003093" y="5142346"/>
+            <a:ext cx="640633" cy="0"/>
+          </a:xfrm>
+          <a:prstGeom prst="straightConnector1">
+            <a:avLst/>
+          </a:prstGeom>
+          <a:ln w="19050">
+            <a:solidFill>
+              <a:schemeClr val="tx1">
+                <a:lumMod val="75000"/>
+                <a:lumOff val="25000"/>
+              </a:schemeClr>
+            </a:solidFill>
+            <a:tailEnd type="triangle"/>
+          </a:ln>
+        </p:spPr>
+        <p:style>
+          <a:lnRef idx="1">
+            <a:schemeClr val="accent1"/>
+          </a:lnRef>
+          <a:fillRef idx="0">
+            <a:schemeClr val="accent1"/>
+          </a:fillRef>
+          <a:effectRef idx="0">
+            <a:schemeClr val="accent1"/>
+          </a:effectRef>
+          <a:fontRef idx="minor">
+            <a:schemeClr val="tx1"/>
+          </a:fontRef>
+        </p:style>
+      </p:cxnSp>
+      <p:sp>
+        <p:nvSpPr>
+          <p:cNvPr id="1044" name="CuadroTexto 1043">
+            <a:extLst>
+              <a:ext uri="{FF2B5EF4-FFF2-40B4-BE49-F238E27FC236}">
+                <a16:creationId xmlns:a16="http://schemas.microsoft.com/office/drawing/2014/main" id="{CEEC9D00-A7CA-51A7-F5CC-441624BE12C3}"/>
+              </a:ext>
+            </a:extLst>
+          </p:cNvPr>
+          <p:cNvSpPr txBox="1"/>
+          <p:nvPr/>
+        </p:nvSpPr>
+        <p:spPr>
+          <a:xfrm>
+            <a:off x="1948095" y="4599571"/>
+            <a:ext cx="979909" cy="369332"/>
+          </a:xfrm>
+          <a:prstGeom prst="rect">
+            <a:avLst/>
+          </a:prstGeom>
+          <a:noFill/>
+        </p:spPr>
+        <p:txBody>
+          <a:bodyPr wrap="square" rtlCol="0">
+            <a:spAutoFit/>
+          </a:bodyPr>
+          <a:lstStyle/>
+          <a:p>
+            <a:r>
+              <a:rPr lang="es-ES" sz="1000" b="1" dirty="0">
+                <a:solidFill>
+                  <a:schemeClr val="bg1"/>
+                </a:solidFill>
+              </a:rPr>
+              <a:t>API</a:t>
+            </a:r>
+          </a:p>
+          <a:p>
+            <a:r>
+              <a:rPr lang="es-ES" sz="800" dirty="0">
+                <a:solidFill>
+                  <a:srgbClr val="CC99FF"/>
+                </a:solidFill>
+              </a:rPr>
+              <a:t>Click see more</a:t>
+            </a:r>
+          </a:p>
+        </p:txBody>
+      </p:sp>
+      <p:cxnSp>
+        <p:nvCxnSpPr>
+          <p:cNvPr id="1045" name="Conector recto de flecha 1044">
+            <a:extLst>
+              <a:ext uri="{FF2B5EF4-FFF2-40B4-BE49-F238E27FC236}">
+                <a16:creationId xmlns:a16="http://schemas.microsoft.com/office/drawing/2014/main" id="{8F83210A-F60C-3D15-1339-A4A070C2A724}"/>
+              </a:ext>
+            </a:extLst>
+          </p:cNvPr>
+          <p:cNvCxnSpPr>
+            <a:cxnSpLocks/>
+          </p:cNvCxnSpPr>
+          <p:nvPr/>
+        </p:nvCxnSpPr>
+        <p:spPr>
+          <a:xfrm>
+            <a:off x="2165987" y="5956122"/>
+            <a:ext cx="669313" cy="0"/>
+          </a:xfrm>
+          <a:prstGeom prst="straightConnector1">
+            <a:avLst/>
+          </a:prstGeom>
+          <a:ln w="19050">
+            <a:solidFill>
+              <a:schemeClr val="tx1">
+                <a:lumMod val="75000"/>
+                <a:lumOff val="25000"/>
+              </a:schemeClr>
+            </a:solidFill>
+            <a:tailEnd type="triangle"/>
+          </a:ln>
+        </p:spPr>
+        <p:style>
+          <a:lnRef idx="1">
+            <a:schemeClr val="accent1"/>
+          </a:lnRef>
+          <a:fillRef idx="0">
+            <a:schemeClr val="accent1"/>
+          </a:fillRef>
+          <a:effectRef idx="0">
+            <a:schemeClr val="accent1"/>
+          </a:effectRef>
+          <a:fontRef idx="minor">
+            <a:schemeClr val="tx1"/>
+          </a:fontRef>
+        </p:style>
+      </p:cxnSp>
+      <p:cxnSp>
+        <p:nvCxnSpPr>
+          <p:cNvPr id="1046" name="Conector recto de flecha 1045">
+            <a:extLst>
+              <a:ext uri="{FF2B5EF4-FFF2-40B4-BE49-F238E27FC236}">
+                <a16:creationId xmlns:a16="http://schemas.microsoft.com/office/drawing/2014/main" id="{C9CFAD2F-FACE-5DE6-5415-8BD78F4CB7B7}"/>
+              </a:ext>
+            </a:extLst>
+          </p:cNvPr>
+          <p:cNvCxnSpPr>
+            <a:cxnSpLocks/>
+          </p:cNvCxnSpPr>
+          <p:nvPr/>
+        </p:nvCxnSpPr>
+        <p:spPr>
+          <a:xfrm flipH="1">
+            <a:off x="2053674" y="6067359"/>
+            <a:ext cx="640633" cy="0"/>
+          </a:xfrm>
+          <a:prstGeom prst="straightConnector1">
+            <a:avLst/>
+          </a:prstGeom>
+          <a:ln w="19050">
+            <a:solidFill>
+              <a:schemeClr val="tx1">
+                <a:lumMod val="75000"/>
+                <a:lumOff val="25000"/>
+              </a:schemeClr>
+            </a:solidFill>
+            <a:tailEnd type="triangle"/>
+          </a:ln>
+        </p:spPr>
+        <p:style>
+          <a:lnRef idx="1">
+            <a:schemeClr val="accent1"/>
+          </a:lnRef>
+          <a:fillRef idx="0">
+            <a:schemeClr val="accent1"/>
+          </a:fillRef>
+          <a:effectRef idx="0">
+            <a:schemeClr val="accent1"/>
+          </a:effectRef>
+          <a:fontRef idx="minor">
+            <a:schemeClr val="tx1"/>
+          </a:fontRef>
+        </p:style>
+      </p:cxnSp>
+      <p:sp>
+        <p:nvSpPr>
+          <p:cNvPr id="1047" name="CuadroTexto 1046">
+            <a:extLst>
+              <a:ext uri="{FF2B5EF4-FFF2-40B4-BE49-F238E27FC236}">
+                <a16:creationId xmlns:a16="http://schemas.microsoft.com/office/drawing/2014/main" id="{1AE8866D-34B6-DEAB-C57E-0D4B07D5F8C3}"/>
+              </a:ext>
+            </a:extLst>
+          </p:cNvPr>
+          <p:cNvSpPr txBox="1"/>
+          <p:nvPr/>
+        </p:nvSpPr>
+        <p:spPr>
+          <a:xfrm>
+            <a:off x="1998676" y="5524584"/>
+            <a:ext cx="979909" cy="369332"/>
+          </a:xfrm>
+          <a:prstGeom prst="rect">
+            <a:avLst/>
+          </a:prstGeom>
+          <a:noFill/>
+        </p:spPr>
+        <p:txBody>
+          <a:bodyPr wrap="square" rtlCol="0">
+            <a:spAutoFit/>
+          </a:bodyPr>
+          <a:lstStyle/>
+          <a:p>
+            <a:r>
+              <a:rPr lang="es-ES" sz="1000" b="1" dirty="0">
+                <a:solidFill>
+                  <a:schemeClr val="bg1"/>
+                </a:solidFill>
+              </a:rPr>
+              <a:t>API</a:t>
+            </a:r>
+          </a:p>
+          <a:p>
+            <a:r>
+              <a:rPr lang="es-ES" sz="800" dirty="0">
+                <a:solidFill>
+                  <a:srgbClr val="CC99FF"/>
+                </a:solidFill>
+              </a:rPr>
+              <a:t>Click see more</a:t>
+            </a:r>
+          </a:p>
+        </p:txBody>
+      </p:sp>
+      <p:sp>
+        <p:nvSpPr>
+          <p:cNvPr id="1049" name="CuadroTexto 1048">
+            <a:extLst>
+              <a:ext uri="{FF2B5EF4-FFF2-40B4-BE49-F238E27FC236}">
+                <a16:creationId xmlns:a16="http://schemas.microsoft.com/office/drawing/2014/main" id="{ED69C0B8-9715-AE47-9990-C014F0060D06}"/>
+              </a:ext>
+            </a:extLst>
+          </p:cNvPr>
+          <p:cNvSpPr txBox="1"/>
+          <p:nvPr/>
+        </p:nvSpPr>
+        <p:spPr>
+          <a:xfrm>
+            <a:off x="7374496" y="1217007"/>
+            <a:ext cx="1084991" cy="369332"/>
+          </a:xfrm>
+          <a:prstGeom prst="rect">
+            <a:avLst/>
+          </a:prstGeom>
+          <a:noFill/>
+        </p:spPr>
+        <p:txBody>
+          <a:bodyPr wrap="square" rtlCol="0">
+            <a:spAutoFit/>
+          </a:bodyPr>
+          <a:lstStyle/>
+          <a:p>
+            <a:r>
+              <a:rPr lang="es-ES" sz="1000" b="1" dirty="0">
+                <a:solidFill>
+                  <a:schemeClr val="bg1"/>
+                </a:solidFill>
+              </a:rPr>
+              <a:t>WooCommerce</a:t>
+            </a:r>
+          </a:p>
+          <a:p>
+            <a:r>
+              <a:rPr lang="es-ES" sz="800" dirty="0">
+                <a:solidFill>
+                  <a:srgbClr val="CC99FF"/>
+                </a:solidFill>
+              </a:rPr>
+              <a:t>Click see more</a:t>
+            </a:r>
+          </a:p>
+        </p:txBody>
+      </p:sp>
+      <p:cxnSp>
+        <p:nvCxnSpPr>
+          <p:cNvPr id="1050" name="Conector recto de flecha 1049">
+            <a:extLst>
+              <a:ext uri="{FF2B5EF4-FFF2-40B4-BE49-F238E27FC236}">
+                <a16:creationId xmlns:a16="http://schemas.microsoft.com/office/drawing/2014/main" id="{4E78854A-2E8F-A22C-94DF-5023DA150D2B}"/>
+              </a:ext>
+            </a:extLst>
+          </p:cNvPr>
+          <p:cNvCxnSpPr>
+            <a:cxnSpLocks/>
+          </p:cNvCxnSpPr>
+          <p:nvPr/>
+        </p:nvCxnSpPr>
+        <p:spPr>
+          <a:xfrm>
+            <a:off x="4205671" y="1355066"/>
+            <a:ext cx="669313" cy="0"/>
+          </a:xfrm>
+          <a:prstGeom prst="straightConnector1">
+            <a:avLst/>
+          </a:prstGeom>
+          <a:ln w="19050">
+            <a:solidFill>
+              <a:schemeClr val="tx1">
+                <a:lumMod val="75000"/>
+                <a:lumOff val="25000"/>
+              </a:schemeClr>
+            </a:solidFill>
+            <a:tailEnd type="triangle"/>
+          </a:ln>
+        </p:spPr>
+        <p:style>
+          <a:lnRef idx="1">
+            <a:schemeClr val="accent1"/>
+          </a:lnRef>
+          <a:fillRef idx="0">
+            <a:schemeClr val="accent1"/>
+          </a:fillRef>
+          <a:effectRef idx="0">
+            <a:schemeClr val="accent1"/>
+          </a:effectRef>
+          <a:fontRef idx="minor">
+            <a:schemeClr val="tx1"/>
+          </a:fontRef>
+        </p:style>
+      </p:cxnSp>
+      <p:cxnSp>
+        <p:nvCxnSpPr>
+          <p:cNvPr id="1051" name="Conector recto de flecha 1050">
+            <a:extLst>
+              <a:ext uri="{FF2B5EF4-FFF2-40B4-BE49-F238E27FC236}">
+                <a16:creationId xmlns:a16="http://schemas.microsoft.com/office/drawing/2014/main" id="{FAABB77C-9E8C-BC5E-AFEE-19DED9A3C467}"/>
+              </a:ext>
+            </a:extLst>
+          </p:cNvPr>
+          <p:cNvCxnSpPr>
+            <a:cxnSpLocks/>
+          </p:cNvCxnSpPr>
+          <p:nvPr/>
+        </p:nvCxnSpPr>
+        <p:spPr>
+          <a:xfrm flipH="1">
+            <a:off x="4093358" y="1466303"/>
+            <a:ext cx="640633" cy="0"/>
+          </a:xfrm>
+          <a:prstGeom prst="straightConnector1">
+            <a:avLst/>
+          </a:prstGeom>
+          <a:ln w="19050">
+            <a:solidFill>
+              <a:schemeClr val="tx1">
+                <a:lumMod val="75000"/>
+                <a:lumOff val="25000"/>
+              </a:schemeClr>
+            </a:solidFill>
+            <a:tailEnd type="triangle"/>
+          </a:ln>
+        </p:spPr>
+        <p:style>
+          <a:lnRef idx="1">
+            <a:schemeClr val="accent1"/>
+          </a:lnRef>
+          <a:fillRef idx="0">
+            <a:schemeClr val="accent1"/>
+          </a:fillRef>
+          <a:effectRef idx="0">
+            <a:schemeClr val="accent1"/>
+          </a:effectRef>
+          <a:fontRef idx="minor">
+            <a:schemeClr val="tx1"/>
+          </a:fontRef>
+        </p:style>
+      </p:cxnSp>
+      <p:sp>
+        <p:nvSpPr>
+          <p:cNvPr id="1052" name="CuadroTexto 1051">
+            <a:extLst>
+              <a:ext uri="{FF2B5EF4-FFF2-40B4-BE49-F238E27FC236}">
+                <a16:creationId xmlns:a16="http://schemas.microsoft.com/office/drawing/2014/main" id="{C0362E7B-252B-B943-2FDB-920CD30DD7D7}"/>
+              </a:ext>
+            </a:extLst>
+          </p:cNvPr>
+          <p:cNvSpPr txBox="1"/>
+          <p:nvPr/>
+        </p:nvSpPr>
+        <p:spPr>
+          <a:xfrm>
+            <a:off x="4038360" y="923528"/>
+            <a:ext cx="979909" cy="369332"/>
+          </a:xfrm>
+          <a:prstGeom prst="rect">
+            <a:avLst/>
+          </a:prstGeom>
+          <a:noFill/>
+        </p:spPr>
+        <p:txBody>
+          <a:bodyPr wrap="square" rtlCol="0">
+            <a:spAutoFit/>
+          </a:bodyPr>
+          <a:lstStyle/>
+          <a:p>
+            <a:r>
+              <a:rPr lang="es-ES" sz="1000" b="1" dirty="0">
+                <a:solidFill>
+                  <a:schemeClr val="bg1"/>
+                </a:solidFill>
+              </a:rPr>
+              <a:t>API</a:t>
+            </a:r>
+          </a:p>
+          <a:p>
+            <a:r>
+              <a:rPr lang="es-ES" sz="800" dirty="0">
+                <a:solidFill>
+                  <a:srgbClr val="CC99FF"/>
+                </a:solidFill>
+              </a:rPr>
+              <a:t>Click see more</a:t>
+            </a:r>
+          </a:p>
+        </p:txBody>
+      </p:sp>
+      <p:cxnSp>
+        <p:nvCxnSpPr>
+          <p:cNvPr id="1053" name="Conector recto de flecha 1052">
+            <a:extLst>
+              <a:ext uri="{FF2B5EF4-FFF2-40B4-BE49-F238E27FC236}">
+                <a16:creationId xmlns:a16="http://schemas.microsoft.com/office/drawing/2014/main" id="{1FE54601-D259-1AAE-D105-C9F051F59942}"/>
+              </a:ext>
+            </a:extLst>
+          </p:cNvPr>
+          <p:cNvCxnSpPr>
+            <a:cxnSpLocks/>
+          </p:cNvCxnSpPr>
+          <p:nvPr/>
+        </p:nvCxnSpPr>
+        <p:spPr>
+          <a:xfrm>
+            <a:off x="6429833" y="1337333"/>
+            <a:ext cx="669313" cy="0"/>
+          </a:xfrm>
+          <a:prstGeom prst="straightConnector1">
+            <a:avLst/>
+          </a:prstGeom>
+          <a:ln w="19050">
+            <a:solidFill>
+              <a:schemeClr val="tx1">
+                <a:lumMod val="75000"/>
+                <a:lumOff val="25000"/>
+              </a:schemeClr>
+            </a:solidFill>
+            <a:tailEnd type="triangle"/>
+          </a:ln>
+        </p:spPr>
+        <p:style>
+          <a:lnRef idx="1">
+            <a:schemeClr val="accent1"/>
+          </a:lnRef>
+          <a:fillRef idx="0">
+            <a:schemeClr val="accent1"/>
+          </a:fillRef>
+          <a:effectRef idx="0">
+            <a:schemeClr val="accent1"/>
+          </a:effectRef>
+          <a:fontRef idx="minor">
+            <a:schemeClr val="tx1"/>
+          </a:fontRef>
+        </p:style>
+      </p:cxnSp>
+      <p:cxnSp>
+        <p:nvCxnSpPr>
+          <p:cNvPr id="1054" name="Conector recto de flecha 1053">
+            <a:extLst>
+              <a:ext uri="{FF2B5EF4-FFF2-40B4-BE49-F238E27FC236}">
+                <a16:creationId xmlns:a16="http://schemas.microsoft.com/office/drawing/2014/main" id="{9AA11837-CB1E-3F3D-D122-B60F659B002B}"/>
+              </a:ext>
+            </a:extLst>
+          </p:cNvPr>
+          <p:cNvCxnSpPr>
+            <a:cxnSpLocks/>
+          </p:cNvCxnSpPr>
+          <p:nvPr/>
+        </p:nvCxnSpPr>
+        <p:spPr>
+          <a:xfrm flipH="1">
+            <a:off x="6317520" y="1448570"/>
+            <a:ext cx="640633" cy="0"/>
+          </a:xfrm>
+          <a:prstGeom prst="straightConnector1">
+            <a:avLst/>
+          </a:prstGeom>
+          <a:ln w="19050">
+            <a:solidFill>
+              <a:schemeClr val="tx1">
+                <a:lumMod val="75000"/>
+                <a:lumOff val="25000"/>
+              </a:schemeClr>
+            </a:solidFill>
+            <a:tailEnd type="triangle"/>
+          </a:ln>
+        </p:spPr>
+        <p:style>
+          <a:lnRef idx="1">
+            <a:schemeClr val="accent1"/>
+          </a:lnRef>
+          <a:fillRef idx="0">
+            <a:schemeClr val="accent1"/>
+          </a:fillRef>
+          <a:effectRef idx="0">
+            <a:schemeClr val="accent1"/>
+          </a:effectRef>
+          <a:fontRef idx="minor">
+            <a:schemeClr val="tx1"/>
+          </a:fontRef>
+        </p:style>
+      </p:cxnSp>
+      <p:sp>
+        <p:nvSpPr>
+          <p:cNvPr id="1055" name="CuadroTexto 1054">
+            <a:extLst>
+              <a:ext uri="{FF2B5EF4-FFF2-40B4-BE49-F238E27FC236}">
+                <a16:creationId xmlns:a16="http://schemas.microsoft.com/office/drawing/2014/main" id="{E7063439-5A57-4BDB-906E-3C302314E41D}"/>
+              </a:ext>
+            </a:extLst>
+          </p:cNvPr>
+          <p:cNvSpPr txBox="1"/>
+          <p:nvPr/>
+        </p:nvSpPr>
+        <p:spPr>
+          <a:xfrm>
+            <a:off x="6262522" y="905795"/>
+            <a:ext cx="979909" cy="369332"/>
+          </a:xfrm>
+          <a:prstGeom prst="rect">
+            <a:avLst/>
+          </a:prstGeom>
+          <a:noFill/>
+        </p:spPr>
+        <p:txBody>
+          <a:bodyPr wrap="square" rtlCol="0">
+            <a:spAutoFit/>
+          </a:bodyPr>
+          <a:lstStyle/>
+          <a:p>
+            <a:r>
+              <a:rPr lang="es-ES" sz="1000" b="1" dirty="0">
+                <a:solidFill>
+                  <a:schemeClr val="bg1"/>
+                </a:solidFill>
+              </a:rPr>
+              <a:t>API</a:t>
+            </a:r>
+          </a:p>
+          <a:p>
+            <a:r>
+              <a:rPr lang="es-ES" sz="800" dirty="0">
+                <a:solidFill>
+                  <a:srgbClr val="CC99FF"/>
+                </a:solidFill>
+              </a:rPr>
+              <a:t>Click see more</a:t>
+            </a:r>
+          </a:p>
+        </p:txBody>
+      </p:sp>
+      <p:sp>
+        <p:nvSpPr>
+          <p:cNvPr id="1056" name="CuadroTexto 1055">
+            <a:extLst>
+              <a:ext uri="{FF2B5EF4-FFF2-40B4-BE49-F238E27FC236}">
+                <a16:creationId xmlns:a16="http://schemas.microsoft.com/office/drawing/2014/main" id="{4ACA0C53-E179-DFE3-5C8C-1035C44E818C}"/>
+              </a:ext>
+            </a:extLst>
+          </p:cNvPr>
+          <p:cNvSpPr txBox="1"/>
+          <p:nvPr/>
+        </p:nvSpPr>
+        <p:spPr>
+          <a:xfrm>
+            <a:off x="7394368" y="2162933"/>
+            <a:ext cx="1084991" cy="369332"/>
+          </a:xfrm>
+          <a:prstGeom prst="rect">
+            <a:avLst/>
+          </a:prstGeom>
+          <a:noFill/>
+        </p:spPr>
+        <p:txBody>
+          <a:bodyPr wrap="square" rtlCol="0">
+            <a:spAutoFit/>
+          </a:bodyPr>
+          <a:lstStyle/>
+          <a:p>
+            <a:r>
+              <a:rPr lang="es-ES" sz="1000" b="1" dirty="0">
+                <a:solidFill>
+                  <a:schemeClr val="bg1"/>
+                </a:solidFill>
+              </a:rPr>
+              <a:t>Power BI</a:t>
+            </a:r>
+          </a:p>
+          <a:p>
+            <a:r>
+              <a:rPr lang="es-ES" sz="800" dirty="0">
+                <a:solidFill>
+                  <a:srgbClr val="CC99FF"/>
+                </a:solidFill>
+              </a:rPr>
+              <a:t>Click see more</a:t>
+            </a:r>
+          </a:p>
+        </p:txBody>
+      </p:sp>
+      <p:sp>
+        <p:nvSpPr>
+          <p:cNvPr id="1058" name="CuadroTexto 1057">
+            <a:extLst>
+              <a:ext uri="{FF2B5EF4-FFF2-40B4-BE49-F238E27FC236}">
+                <a16:creationId xmlns:a16="http://schemas.microsoft.com/office/drawing/2014/main" id="{F3337BA1-AA38-709E-BCEA-9CF3C7C05456}"/>
+              </a:ext>
+            </a:extLst>
+          </p:cNvPr>
+          <p:cNvSpPr txBox="1"/>
+          <p:nvPr/>
+        </p:nvSpPr>
+        <p:spPr>
+          <a:xfrm>
+            <a:off x="7410635" y="3076545"/>
+            <a:ext cx="1084991" cy="369332"/>
+          </a:xfrm>
+          <a:prstGeom prst="rect">
+            <a:avLst/>
+          </a:prstGeom>
+          <a:noFill/>
+        </p:spPr>
+        <p:txBody>
+          <a:bodyPr wrap="square" rtlCol="0">
+            <a:spAutoFit/>
+          </a:bodyPr>
+          <a:lstStyle/>
+          <a:p>
+            <a:r>
+              <a:rPr lang="es-ES" sz="1000" b="1" dirty="0">
+                <a:solidFill>
+                  <a:schemeClr val="bg1"/>
+                </a:solidFill>
+              </a:rPr>
+              <a:t>Power BI</a:t>
+            </a:r>
+          </a:p>
+          <a:p>
+            <a:r>
+              <a:rPr lang="es-ES" sz="800" dirty="0">
+                <a:solidFill>
+                  <a:srgbClr val="CC99FF"/>
+                </a:solidFill>
+              </a:rPr>
+              <a:t>Click see more</a:t>
+            </a:r>
+          </a:p>
+        </p:txBody>
+      </p:sp>
+      <p:cxnSp>
+        <p:nvCxnSpPr>
+          <p:cNvPr id="1059" name="Conector recto de flecha 1058">
+            <a:extLst>
+              <a:ext uri="{FF2B5EF4-FFF2-40B4-BE49-F238E27FC236}">
+                <a16:creationId xmlns:a16="http://schemas.microsoft.com/office/drawing/2014/main" id="{A864226A-9469-1AE3-F181-7495B6AB5351}"/>
+              </a:ext>
+            </a:extLst>
+          </p:cNvPr>
+          <p:cNvCxnSpPr>
+            <a:cxnSpLocks/>
+          </p:cNvCxnSpPr>
+          <p:nvPr/>
+        </p:nvCxnSpPr>
+        <p:spPr>
+          <a:xfrm>
+            <a:off x="6429833" y="2319488"/>
+            <a:ext cx="669313" cy="0"/>
+          </a:xfrm>
+          <a:prstGeom prst="straightConnector1">
+            <a:avLst/>
+          </a:prstGeom>
+          <a:ln w="19050">
+            <a:solidFill>
+              <a:schemeClr val="tx1">
+                <a:lumMod val="75000"/>
+                <a:lumOff val="25000"/>
+              </a:schemeClr>
+            </a:solidFill>
+            <a:tailEnd type="triangle"/>
+          </a:ln>
+        </p:spPr>
+        <p:style>
+          <a:lnRef idx="1">
+            <a:schemeClr val="accent1"/>
+          </a:lnRef>
+          <a:fillRef idx="0">
+            <a:schemeClr val="accent1"/>
+          </a:fillRef>
+          <a:effectRef idx="0">
+            <a:schemeClr val="accent1"/>
+          </a:effectRef>
+          <a:fontRef idx="minor">
+            <a:schemeClr val="tx1"/>
+          </a:fontRef>
+        </p:style>
+      </p:cxnSp>
+      <p:cxnSp>
+        <p:nvCxnSpPr>
+          <p:cNvPr id="1060" name="Conector recto de flecha 1059">
+            <a:extLst>
+              <a:ext uri="{FF2B5EF4-FFF2-40B4-BE49-F238E27FC236}">
+                <a16:creationId xmlns:a16="http://schemas.microsoft.com/office/drawing/2014/main" id="{06A7994D-3229-9560-2787-7FC8118B50B3}"/>
+              </a:ext>
+            </a:extLst>
+          </p:cNvPr>
+          <p:cNvCxnSpPr>
+            <a:cxnSpLocks/>
+          </p:cNvCxnSpPr>
+          <p:nvPr/>
+        </p:nvCxnSpPr>
+        <p:spPr>
+          <a:xfrm flipH="1">
+            <a:off x="6317520" y="2430725"/>
+            <a:ext cx="640633" cy="0"/>
+          </a:xfrm>
+          <a:prstGeom prst="straightConnector1">
+            <a:avLst/>
+          </a:prstGeom>
+          <a:ln w="19050">
+            <a:solidFill>
+              <a:schemeClr val="tx1">
+                <a:lumMod val="75000"/>
+                <a:lumOff val="25000"/>
+              </a:schemeClr>
+            </a:solidFill>
+            <a:tailEnd type="triangle"/>
+          </a:ln>
+        </p:spPr>
+        <p:style>
+          <a:lnRef idx="1">
+            <a:schemeClr val="accent1"/>
+          </a:lnRef>
+          <a:fillRef idx="0">
+            <a:schemeClr val="accent1"/>
+          </a:fillRef>
+          <a:effectRef idx="0">
+            <a:schemeClr val="accent1"/>
+          </a:effectRef>
+          <a:fontRef idx="minor">
+            <a:schemeClr val="tx1"/>
+          </a:fontRef>
+        </p:style>
+      </p:cxnSp>
+      <p:sp>
+        <p:nvSpPr>
+          <p:cNvPr id="1061" name="CuadroTexto 1060">
+            <a:extLst>
+              <a:ext uri="{FF2B5EF4-FFF2-40B4-BE49-F238E27FC236}">
+                <a16:creationId xmlns:a16="http://schemas.microsoft.com/office/drawing/2014/main" id="{86A60A4F-3AE3-F7AB-1A7A-BDC688F61BDD}"/>
+              </a:ext>
+            </a:extLst>
+          </p:cNvPr>
+          <p:cNvSpPr txBox="1"/>
+          <p:nvPr/>
+        </p:nvSpPr>
+        <p:spPr>
+          <a:xfrm>
+            <a:off x="6262522" y="1887950"/>
+            <a:ext cx="979909" cy="369332"/>
+          </a:xfrm>
+          <a:prstGeom prst="rect">
+            <a:avLst/>
+          </a:prstGeom>
+          <a:noFill/>
+        </p:spPr>
+        <p:txBody>
+          <a:bodyPr wrap="square" rtlCol="0">
+            <a:spAutoFit/>
+          </a:bodyPr>
+          <a:lstStyle/>
+          <a:p>
+            <a:r>
+              <a:rPr lang="es-ES" sz="1000" b="1" dirty="0">
+                <a:solidFill>
+                  <a:schemeClr val="bg1"/>
+                </a:solidFill>
+              </a:rPr>
+              <a:t>API</a:t>
+            </a:r>
+          </a:p>
+          <a:p>
+            <a:r>
+              <a:rPr lang="es-ES" sz="800" dirty="0">
+                <a:solidFill>
+                  <a:srgbClr val="CC99FF"/>
+                </a:solidFill>
+              </a:rPr>
+              <a:t>Click see more</a:t>
+            </a:r>
+          </a:p>
+        </p:txBody>
+      </p:sp>
+      <p:cxnSp>
+        <p:nvCxnSpPr>
+          <p:cNvPr id="1062" name="Conector recto de flecha 1061">
+            <a:extLst>
+              <a:ext uri="{FF2B5EF4-FFF2-40B4-BE49-F238E27FC236}">
+                <a16:creationId xmlns:a16="http://schemas.microsoft.com/office/drawing/2014/main" id="{6CE096FD-13C2-F6E8-E4D2-742BB56B0156}"/>
+              </a:ext>
+            </a:extLst>
+          </p:cNvPr>
+          <p:cNvCxnSpPr>
+            <a:cxnSpLocks/>
+          </p:cNvCxnSpPr>
+          <p:nvPr/>
+        </p:nvCxnSpPr>
+        <p:spPr>
+          <a:xfrm>
+            <a:off x="6477964" y="3261211"/>
+            <a:ext cx="669313" cy="0"/>
+          </a:xfrm>
+          <a:prstGeom prst="straightConnector1">
+            <a:avLst/>
+          </a:prstGeom>
+          <a:ln w="19050">
+            <a:solidFill>
+              <a:schemeClr val="tx1">
+                <a:lumMod val="75000"/>
+                <a:lumOff val="25000"/>
+              </a:schemeClr>
+            </a:solidFill>
+            <a:tailEnd type="triangle"/>
+          </a:ln>
+        </p:spPr>
+        <p:style>
+          <a:lnRef idx="1">
+            <a:schemeClr val="accent1"/>
+          </a:lnRef>
+          <a:fillRef idx="0">
+            <a:schemeClr val="accent1"/>
+          </a:fillRef>
+          <a:effectRef idx="0">
+            <a:schemeClr val="accent1"/>
+          </a:effectRef>
+          <a:fontRef idx="minor">
+            <a:schemeClr val="tx1"/>
+          </a:fontRef>
+        </p:style>
+      </p:cxnSp>
+      <p:cxnSp>
+        <p:nvCxnSpPr>
+          <p:cNvPr id="1063" name="Conector recto de flecha 1062">
+            <a:extLst>
+              <a:ext uri="{FF2B5EF4-FFF2-40B4-BE49-F238E27FC236}">
+                <a16:creationId xmlns:a16="http://schemas.microsoft.com/office/drawing/2014/main" id="{28CAF3ED-1D79-26EA-5F29-68DDC5FEEF5A}"/>
+              </a:ext>
+            </a:extLst>
+          </p:cNvPr>
+          <p:cNvCxnSpPr>
+            <a:cxnSpLocks/>
+          </p:cNvCxnSpPr>
+          <p:nvPr/>
+        </p:nvCxnSpPr>
+        <p:spPr>
+          <a:xfrm flipH="1">
+            <a:off x="6365651" y="3372448"/>
+            <a:ext cx="640633" cy="0"/>
+          </a:xfrm>
+          <a:prstGeom prst="straightConnector1">
+            <a:avLst/>
+          </a:prstGeom>
+          <a:ln w="19050">
+            <a:solidFill>
+              <a:schemeClr val="tx1">
+                <a:lumMod val="75000"/>
+                <a:lumOff val="25000"/>
+              </a:schemeClr>
+            </a:solidFill>
+            <a:tailEnd type="triangle"/>
+          </a:ln>
+        </p:spPr>
+        <p:style>
+          <a:lnRef idx="1">
+            <a:schemeClr val="accent1"/>
+          </a:lnRef>
+          <a:fillRef idx="0">
+            <a:schemeClr val="accent1"/>
+          </a:fillRef>
+          <a:effectRef idx="0">
+            <a:schemeClr val="accent1"/>
+          </a:effectRef>
+          <a:fontRef idx="minor">
+            <a:schemeClr val="tx1"/>
+          </a:fontRef>
+        </p:style>
+      </p:cxnSp>
+      <p:sp>
+        <p:nvSpPr>
+          <p:cNvPr id="1064" name="CuadroTexto 1063">
+            <a:extLst>
+              <a:ext uri="{FF2B5EF4-FFF2-40B4-BE49-F238E27FC236}">
+                <a16:creationId xmlns:a16="http://schemas.microsoft.com/office/drawing/2014/main" id="{67E782C5-36CE-4EB4-E922-A1B2A97ABE13}"/>
+              </a:ext>
+            </a:extLst>
+          </p:cNvPr>
+          <p:cNvSpPr txBox="1"/>
+          <p:nvPr/>
+        </p:nvSpPr>
+        <p:spPr>
+          <a:xfrm>
+            <a:off x="6310653" y="2829673"/>
+            <a:ext cx="979909" cy="369332"/>
+          </a:xfrm>
+          <a:prstGeom prst="rect">
+            <a:avLst/>
+          </a:prstGeom>
+          <a:noFill/>
+        </p:spPr>
+        <p:txBody>
+          <a:bodyPr wrap="square" rtlCol="0">
+            <a:spAutoFit/>
+          </a:bodyPr>
+          <a:lstStyle/>
+          <a:p>
+            <a:r>
+              <a:rPr lang="es-ES" sz="1000" b="1" dirty="0">
+                <a:solidFill>
+                  <a:schemeClr val="bg1"/>
+                </a:solidFill>
+              </a:rPr>
+              <a:t>API</a:t>
+            </a:r>
+          </a:p>
+          <a:p>
+            <a:r>
+              <a:rPr lang="es-ES" sz="800" dirty="0">
+                <a:solidFill>
+                  <a:srgbClr val="CC99FF"/>
+                </a:solidFill>
+              </a:rPr>
+              <a:t>Click see more</a:t>
+            </a:r>
+          </a:p>
+        </p:txBody>
+      </p:sp>
+      <p:pic>
+        <p:nvPicPr>
+          <p:cNvPr id="1065" name="Picture 8" descr="Expertise Sciforma®">
+            <a:extLst>
+              <a:ext uri="{FF2B5EF4-FFF2-40B4-BE49-F238E27FC236}">
+                <a16:creationId xmlns:a16="http://schemas.microsoft.com/office/drawing/2014/main" id="{99487222-EC93-BC0A-D42F-6413851D30D1}"/>
+              </a:ext>
+            </a:extLst>
+          </p:cNvPr>
+          <p:cNvPicPr>
+            <a:picLocks noChangeAspect="1" noChangeArrowheads="1"/>
+          </p:cNvPicPr>
+          <p:nvPr/>
+        </p:nvPicPr>
+        <p:blipFill>
+          <a:blip r:embed="rId13">
+            <a:extLst>
+              <a:ext uri="{28A0092B-C50C-407E-A947-70E740481C1C}">
+                <a14:useLocalDpi xmlns:a14="http://schemas.microsoft.com/office/drawing/2010/main" val="0"/>
+              </a:ext>
+            </a:extLst>
+          </a:blip>
+          <a:srcRect/>
+          <a:stretch>
+            <a:fillRect/>
+          </a:stretch>
+        </p:blipFill>
+        <p:spPr bwMode="auto">
+          <a:xfrm>
+            <a:off x="7476795" y="3813395"/>
+            <a:ext cx="521739" cy="138247"/>
+          </a:xfrm>
+          <a:prstGeom prst="rect">
+            <a:avLst/>
+          </a:prstGeom>
+          <a:noFill/>
+          <a:extLst>
+            <a:ext uri="{909E8E84-426E-40DD-AFC4-6F175D3DCCD1}">
+              <a14:hiddenFill xmlns:a14="http://schemas.microsoft.com/office/drawing/2010/main">
+                <a:solidFill>
+                  <a:srgbClr val="FFFFFF"/>
+                </a:solidFill>
+              </a14:hiddenFill>
+            </a:ext>
+          </a:extLst>
+        </p:spPr>
+      </p:pic>
+      <p:sp>
+        <p:nvSpPr>
+          <p:cNvPr id="1068" name="CuadroTexto 1067">
+            <a:extLst>
+              <a:ext uri="{FF2B5EF4-FFF2-40B4-BE49-F238E27FC236}">
+                <a16:creationId xmlns:a16="http://schemas.microsoft.com/office/drawing/2014/main" id="{EF8293D5-D80B-C963-C8B4-3D0784BF742F}"/>
+              </a:ext>
+            </a:extLst>
+          </p:cNvPr>
+          <p:cNvSpPr txBox="1"/>
+          <p:nvPr/>
+        </p:nvSpPr>
+        <p:spPr>
+          <a:xfrm>
+            <a:off x="382136" y="271418"/>
+            <a:ext cx="1155640" cy="369332"/>
+          </a:xfrm>
+          <a:prstGeom prst="rect">
+            <a:avLst/>
+          </a:prstGeom>
+          <a:noFill/>
+        </p:spPr>
+        <p:txBody>
+          <a:bodyPr wrap="square" rtlCol="0">
+            <a:spAutoFit/>
+          </a:bodyPr>
+          <a:lstStyle/>
+          <a:p>
+            <a:r>
+              <a:rPr lang="es-ES" b="1" dirty="0">
+                <a:solidFill>
+                  <a:schemeClr val="bg1"/>
+                </a:solidFill>
+              </a:rPr>
+              <a:t>Overview</a:t>
+            </a:r>
+          </a:p>
+        </p:txBody>
+      </p:sp>
+      <p:cxnSp>
+        <p:nvCxnSpPr>
+          <p:cNvPr id="1069" name="Conector recto 1068">
+            <a:extLst>
+              <a:ext uri="{FF2B5EF4-FFF2-40B4-BE49-F238E27FC236}">
+                <a16:creationId xmlns:a16="http://schemas.microsoft.com/office/drawing/2014/main" id="{1594790E-FEE2-A8E3-BBFE-18B6614CA6CE}"/>
+              </a:ext>
+            </a:extLst>
+          </p:cNvPr>
+          <p:cNvCxnSpPr/>
+          <p:nvPr/>
+        </p:nvCxnSpPr>
+        <p:spPr>
+          <a:xfrm>
+            <a:off x="1538622" y="271418"/>
+            <a:ext cx="0" cy="369332"/>
+          </a:xfrm>
+          <a:prstGeom prst="line">
+            <a:avLst/>
+          </a:prstGeom>
+          <a:ln w="38100">
+            <a:solidFill>
+              <a:srgbClr val="CC99FF"/>
+            </a:solidFill>
+          </a:ln>
+        </p:spPr>
+        <p:style>
+          <a:lnRef idx="1">
+            <a:schemeClr val="accent1"/>
+          </a:lnRef>
+          <a:fillRef idx="0">
+            <a:schemeClr val="accent1"/>
+          </a:fillRef>
+          <a:effectRef idx="0">
+            <a:schemeClr val="accent1"/>
+          </a:effectRef>
+          <a:fontRef idx="minor">
+            <a:schemeClr val="tx1"/>
+          </a:fontRef>
+        </p:style>
+      </p:cxnSp>
     </p:spTree>
     <p:extLst>
       <p:ext uri="{BB962C8B-B14F-4D97-AF65-F5344CB8AC3E}">
@@ -4613,10 +6700,1033 @@
           <a:chExt cx="0" cy="0"/>
         </a:xfrm>
       </p:grpSpPr>
+      <p:sp>
+        <p:nvSpPr>
+          <p:cNvPr id="2" name="CuadroTexto 1">
+            <a:extLst>
+              <a:ext uri="{FF2B5EF4-FFF2-40B4-BE49-F238E27FC236}">
+                <a16:creationId xmlns:a16="http://schemas.microsoft.com/office/drawing/2014/main" id="{BAEA0D98-05E4-E10D-EB44-AD566BE7CA96}"/>
+              </a:ext>
+            </a:extLst>
+          </p:cNvPr>
+          <p:cNvSpPr txBox="1"/>
+          <p:nvPr/>
+        </p:nvSpPr>
+        <p:spPr>
+          <a:xfrm>
+            <a:off x="1740816" y="271692"/>
+            <a:ext cx="7227565" cy="369332"/>
+          </a:xfrm>
+          <a:prstGeom prst="rect">
+            <a:avLst/>
+          </a:prstGeom>
+          <a:noFill/>
+        </p:spPr>
+        <p:txBody>
+          <a:bodyPr wrap="square" rtlCol="0">
+            <a:spAutoFit/>
+          </a:bodyPr>
+          <a:lstStyle/>
+          <a:p>
+            <a:r>
+              <a:rPr lang="es-ES" b="1" dirty="0">
+                <a:solidFill>
+                  <a:schemeClr val="bg1"/>
+                </a:solidFill>
+              </a:rPr>
+              <a:t>Tools</a:t>
+            </a:r>
+          </a:p>
+        </p:txBody>
+      </p:sp>
+      <p:sp>
+        <p:nvSpPr>
+          <p:cNvPr id="3" name="CuadroTexto 2">
+            <a:extLst>
+              <a:ext uri="{FF2B5EF4-FFF2-40B4-BE49-F238E27FC236}">
+                <a16:creationId xmlns:a16="http://schemas.microsoft.com/office/drawing/2014/main" id="{DC563E51-BCA8-57FB-C8E8-C22BB50E317E}"/>
+              </a:ext>
+            </a:extLst>
+          </p:cNvPr>
+          <p:cNvSpPr txBox="1"/>
+          <p:nvPr/>
+        </p:nvSpPr>
+        <p:spPr>
+          <a:xfrm>
+            <a:off x="230283" y="271692"/>
+            <a:ext cx="1557877" cy="369332"/>
+          </a:xfrm>
+          <a:prstGeom prst="rect">
+            <a:avLst/>
+          </a:prstGeom>
+          <a:noFill/>
+        </p:spPr>
+        <p:txBody>
+          <a:bodyPr wrap="square" rtlCol="0">
+            <a:spAutoFit/>
+          </a:bodyPr>
+          <a:lstStyle/>
+          <a:p>
+            <a:r>
+              <a:rPr lang="es-ES" b="1" dirty="0">
+                <a:solidFill>
+                  <a:schemeClr val="bg1"/>
+                </a:solidFill>
+              </a:rPr>
+              <a:t>Overview</a:t>
+            </a:r>
+          </a:p>
+        </p:txBody>
+      </p:sp>
+      <p:cxnSp>
+        <p:nvCxnSpPr>
+          <p:cNvPr id="5" name="Conector recto 4">
+            <a:extLst>
+              <a:ext uri="{FF2B5EF4-FFF2-40B4-BE49-F238E27FC236}">
+                <a16:creationId xmlns:a16="http://schemas.microsoft.com/office/drawing/2014/main" id="{FB6C8116-AB68-B8C0-A9B3-12B97A3CCB9F}"/>
+              </a:ext>
+            </a:extLst>
+          </p:cNvPr>
+          <p:cNvCxnSpPr/>
+          <p:nvPr/>
+        </p:nvCxnSpPr>
+        <p:spPr>
+          <a:xfrm>
+            <a:off x="1371600" y="271692"/>
+            <a:ext cx="0" cy="369332"/>
+          </a:xfrm>
+          <a:prstGeom prst="line">
+            <a:avLst/>
+          </a:prstGeom>
+          <a:ln w="38100">
+            <a:solidFill>
+              <a:srgbClr val="CC99FF"/>
+            </a:solidFill>
+          </a:ln>
+        </p:spPr>
+        <p:style>
+          <a:lnRef idx="1">
+            <a:schemeClr val="accent1"/>
+          </a:lnRef>
+          <a:fillRef idx="0">
+            <a:schemeClr val="accent1"/>
+          </a:fillRef>
+          <a:effectRef idx="0">
+            <a:schemeClr val="accent1"/>
+          </a:effectRef>
+          <a:fontRef idx="minor">
+            <a:schemeClr val="tx1"/>
+          </a:fontRef>
+        </p:style>
+      </p:cxnSp>
+      <p:pic>
+        <p:nvPicPr>
+          <p:cNvPr id="6" name="Picture 4" descr="Atlassian Jira y plugins de Jira - Jira">
+            <a:extLst>
+              <a:ext uri="{FF2B5EF4-FFF2-40B4-BE49-F238E27FC236}">
+                <a16:creationId xmlns:a16="http://schemas.microsoft.com/office/drawing/2014/main" id="{651AD1D5-B8F8-6276-A102-3C4504DAFBE5}"/>
+              </a:ext>
+            </a:extLst>
+          </p:cNvPr>
+          <p:cNvPicPr>
+            <a:picLocks noChangeAspect="1" noChangeArrowheads="1"/>
+          </p:cNvPicPr>
+          <p:nvPr/>
+        </p:nvPicPr>
+        <p:blipFill>
+          <a:blip r:embed="rId2">
+            <a:extLst>
+              <a:ext uri="{28A0092B-C50C-407E-A947-70E740481C1C}">
+                <a14:useLocalDpi xmlns:a14="http://schemas.microsoft.com/office/drawing/2010/main" val="0"/>
+              </a:ext>
+            </a:extLst>
+          </a:blip>
+          <a:srcRect/>
+          <a:stretch>
+            <a:fillRect/>
+          </a:stretch>
+        </p:blipFill>
+        <p:spPr bwMode="auto">
+          <a:xfrm>
+            <a:off x="426851" y="4994736"/>
+            <a:ext cx="794083" cy="311405"/>
+          </a:xfrm>
+          <a:prstGeom prst="rect">
+            <a:avLst/>
+          </a:prstGeom>
+          <a:noFill/>
+          <a:extLst>
+            <a:ext uri="{909E8E84-426E-40DD-AFC4-6F175D3DCCD1}">
+              <a14:hiddenFill xmlns:a14="http://schemas.microsoft.com/office/drawing/2010/main">
+                <a:solidFill>
+                  <a:srgbClr val="FFFFFF"/>
+                </a:solidFill>
+              </a14:hiddenFill>
+            </a:ext>
+          </a:extLst>
+        </p:spPr>
+      </p:pic>
+      <p:pic>
+        <p:nvPicPr>
+          <p:cNvPr id="7" name="Picture 8" descr="Github Logo - Free social media icons">
+            <a:extLst>
+              <a:ext uri="{FF2B5EF4-FFF2-40B4-BE49-F238E27FC236}">
+                <a16:creationId xmlns:a16="http://schemas.microsoft.com/office/drawing/2014/main" id="{7F763EF3-0040-EE90-19E4-127BE1D6BB44}"/>
+              </a:ext>
+            </a:extLst>
+          </p:cNvPr>
+          <p:cNvPicPr>
+            <a:picLocks noChangeAspect="1" noChangeArrowheads="1"/>
+          </p:cNvPicPr>
+          <p:nvPr/>
+        </p:nvPicPr>
+        <p:blipFill>
+          <a:blip r:embed="rId3">
+            <a:extLst>
+              <a:ext uri="{28A0092B-C50C-407E-A947-70E740481C1C}">
+                <a14:useLocalDpi xmlns:a14="http://schemas.microsoft.com/office/drawing/2010/main" val="0"/>
+              </a:ext>
+            </a:extLst>
+          </a:blip>
+          <a:srcRect/>
+          <a:stretch>
+            <a:fillRect/>
+          </a:stretch>
+        </p:blipFill>
+        <p:spPr bwMode="auto">
+          <a:xfrm>
+            <a:off x="523081" y="4166365"/>
+            <a:ext cx="337511" cy="337511"/>
+          </a:xfrm>
+          <a:prstGeom prst="rect">
+            <a:avLst/>
+          </a:prstGeom>
+          <a:noFill/>
+          <a:extLst>
+            <a:ext uri="{909E8E84-426E-40DD-AFC4-6F175D3DCCD1}">
+              <a14:hiddenFill xmlns:a14="http://schemas.microsoft.com/office/drawing/2010/main">
+                <a:solidFill>
+                  <a:srgbClr val="FFFFFF"/>
+                </a:solidFill>
+              </a14:hiddenFill>
+            </a:ext>
+          </a:extLst>
+        </p:spPr>
+      </p:pic>
+      <p:pic>
+        <p:nvPicPr>
+          <p:cNvPr id="8" name="Picture 10" descr="Microsoft SharePoint - Viquipèdia, l'enciclopèdia lliure">
+            <a:extLst>
+              <a:ext uri="{FF2B5EF4-FFF2-40B4-BE49-F238E27FC236}">
+                <a16:creationId xmlns:a16="http://schemas.microsoft.com/office/drawing/2014/main" id="{2B25F5F6-9E8E-9549-16A6-45D626852B09}"/>
+              </a:ext>
+            </a:extLst>
+          </p:cNvPr>
+          <p:cNvPicPr>
+            <a:picLocks noChangeAspect="1" noChangeArrowheads="1"/>
+          </p:cNvPicPr>
+          <p:nvPr/>
+        </p:nvPicPr>
+        <p:blipFill>
+          <a:blip r:embed="rId4">
+            <a:extLst>
+              <a:ext uri="{28A0092B-C50C-407E-A947-70E740481C1C}">
+                <a14:useLocalDpi xmlns:a14="http://schemas.microsoft.com/office/drawing/2010/main" val="0"/>
+              </a:ext>
+            </a:extLst>
+          </a:blip>
+          <a:srcRect/>
+          <a:stretch>
+            <a:fillRect/>
+          </a:stretch>
+        </p:blipFill>
+        <p:spPr bwMode="auto">
+          <a:xfrm>
+            <a:off x="476714" y="2485316"/>
+            <a:ext cx="346999" cy="338918"/>
+          </a:xfrm>
+          <a:prstGeom prst="rect">
+            <a:avLst/>
+          </a:prstGeom>
+          <a:noFill/>
+          <a:extLst>
+            <a:ext uri="{909E8E84-426E-40DD-AFC4-6F175D3DCCD1}">
+              <a14:hiddenFill xmlns:a14="http://schemas.microsoft.com/office/drawing/2010/main">
+                <a:solidFill>
+                  <a:srgbClr val="FFFFFF"/>
+                </a:solidFill>
+              </a14:hiddenFill>
+            </a:ext>
+          </a:extLst>
+        </p:spPr>
+      </p:pic>
+      <p:pic>
+        <p:nvPicPr>
+          <p:cNvPr id="9" name="Picture 12" descr="piensasolutions.com (@piensasolutions) / X">
+            <a:extLst>
+              <a:ext uri="{FF2B5EF4-FFF2-40B4-BE49-F238E27FC236}">
+                <a16:creationId xmlns:a16="http://schemas.microsoft.com/office/drawing/2014/main" id="{4E5A405B-BC34-EB80-85B3-0F8B7DA13277}"/>
+              </a:ext>
+            </a:extLst>
+          </p:cNvPr>
+          <p:cNvPicPr>
+            <a:picLocks noChangeAspect="1" noChangeArrowheads="1"/>
+          </p:cNvPicPr>
+          <p:nvPr/>
+        </p:nvPicPr>
+        <p:blipFill>
+          <a:blip r:embed="rId5">
+            <a:extLst>
+              <a:ext uri="{28A0092B-C50C-407E-A947-70E740481C1C}">
+                <a14:useLocalDpi xmlns:a14="http://schemas.microsoft.com/office/drawing/2010/main" val="0"/>
+              </a:ext>
+            </a:extLst>
+          </a:blip>
+          <a:srcRect/>
+          <a:stretch>
+            <a:fillRect/>
+          </a:stretch>
+        </p:blipFill>
+        <p:spPr bwMode="auto">
+          <a:xfrm>
+            <a:off x="444268" y="3274877"/>
+            <a:ext cx="758890" cy="758890"/>
+          </a:xfrm>
+          <a:prstGeom prst="rect">
+            <a:avLst/>
+          </a:prstGeom>
+          <a:noFill/>
+          <a:extLst>
+            <a:ext uri="{909E8E84-426E-40DD-AFC4-6F175D3DCCD1}">
+              <a14:hiddenFill xmlns:a14="http://schemas.microsoft.com/office/drawing/2010/main">
+                <a:solidFill>
+                  <a:srgbClr val="FFFFFF"/>
+                </a:solidFill>
+              </a14:hiddenFill>
+            </a:ext>
+          </a:extLst>
+        </p:spPr>
+      </p:pic>
+      <p:pic>
+        <p:nvPicPr>
+          <p:cNvPr id="10" name="Picture 2" descr="Service Desk Jira | Rootstack">
+            <a:extLst>
+              <a:ext uri="{FF2B5EF4-FFF2-40B4-BE49-F238E27FC236}">
+                <a16:creationId xmlns:a16="http://schemas.microsoft.com/office/drawing/2014/main" id="{B79734C5-65FC-56D4-1262-F73C1669053B}"/>
+              </a:ext>
+            </a:extLst>
+          </p:cNvPr>
+          <p:cNvPicPr>
+            <a:picLocks noChangeAspect="1" noChangeArrowheads="1"/>
+          </p:cNvPicPr>
+          <p:nvPr/>
+        </p:nvPicPr>
+        <p:blipFill>
+          <a:blip r:embed="rId6">
+            <a:extLst>
+              <a:ext uri="{28A0092B-C50C-407E-A947-70E740481C1C}">
+                <a14:useLocalDpi xmlns:a14="http://schemas.microsoft.com/office/drawing/2010/main" val="0"/>
+              </a:ext>
+            </a:extLst>
+          </a:blip>
+          <a:srcRect/>
+          <a:stretch>
+            <a:fillRect/>
+          </a:stretch>
+        </p:blipFill>
+        <p:spPr bwMode="auto">
+          <a:xfrm>
+            <a:off x="9900713" y="2029671"/>
+            <a:ext cx="1438130" cy="455645"/>
+          </a:xfrm>
+          <a:prstGeom prst="rect">
+            <a:avLst/>
+          </a:prstGeom>
+          <a:noFill/>
+          <a:extLst>
+            <a:ext uri="{909E8E84-426E-40DD-AFC4-6F175D3DCCD1}">
+              <a14:hiddenFill xmlns:a14="http://schemas.microsoft.com/office/drawing/2010/main">
+                <a:solidFill>
+                  <a:srgbClr val="FFFFFF"/>
+                </a:solidFill>
+              </a14:hiddenFill>
+            </a:ext>
+          </a:extLst>
+        </p:spPr>
+      </p:pic>
+      <p:pic>
+        <p:nvPicPr>
+          <p:cNvPr id="11" name="Picture 4">
+            <a:extLst>
+              <a:ext uri="{FF2B5EF4-FFF2-40B4-BE49-F238E27FC236}">
+                <a16:creationId xmlns:a16="http://schemas.microsoft.com/office/drawing/2014/main" id="{4B836BC7-1C6B-5BEE-0EBA-9C5B0CCBD9E7}"/>
+              </a:ext>
+            </a:extLst>
+          </p:cNvPr>
+          <p:cNvPicPr>
+            <a:picLocks noChangeAspect="1" noChangeArrowheads="1"/>
+          </p:cNvPicPr>
+          <p:nvPr/>
+        </p:nvPicPr>
+        <p:blipFill>
+          <a:blip r:embed="rId7">
+            <a:extLst>
+              <a:ext uri="{28A0092B-C50C-407E-A947-70E740481C1C}">
+                <a14:useLocalDpi xmlns:a14="http://schemas.microsoft.com/office/drawing/2010/main" val="0"/>
+              </a:ext>
+            </a:extLst>
+          </a:blip>
+          <a:srcRect/>
+          <a:stretch>
+            <a:fillRect/>
+          </a:stretch>
+        </p:blipFill>
+        <p:spPr bwMode="auto">
+          <a:xfrm>
+            <a:off x="454349" y="1901137"/>
+            <a:ext cx="391731" cy="257068"/>
+          </a:xfrm>
+          <a:prstGeom prst="rect">
+            <a:avLst/>
+          </a:prstGeom>
+          <a:noFill/>
+          <a:extLst>
+            <a:ext uri="{909E8E84-426E-40DD-AFC4-6F175D3DCCD1}">
+              <a14:hiddenFill xmlns:a14="http://schemas.microsoft.com/office/drawing/2010/main">
+                <a:solidFill>
+                  <a:srgbClr val="FFFFFF"/>
+                </a:solidFill>
+              </a14:hiddenFill>
+            </a:ext>
+          </a:extLst>
+        </p:spPr>
+      </p:pic>
+      <p:pic>
+        <p:nvPicPr>
+          <p:cNvPr id="12" name="Picture 6" descr="mail Vector Icons free download in SVG, PNG Format">
+            <a:extLst>
+              <a:ext uri="{FF2B5EF4-FFF2-40B4-BE49-F238E27FC236}">
+                <a16:creationId xmlns:a16="http://schemas.microsoft.com/office/drawing/2014/main" id="{114E7F47-D234-9D86-8AAE-2146955A256B}"/>
+              </a:ext>
+            </a:extLst>
+          </p:cNvPr>
+          <p:cNvPicPr>
+            <a:picLocks noChangeAspect="1" noChangeArrowheads="1"/>
+          </p:cNvPicPr>
+          <p:nvPr/>
+        </p:nvPicPr>
+        <p:blipFill>
+          <a:blip r:embed="rId8">
+            <a:extLst>
+              <a:ext uri="{BEBA8EAE-BF5A-486C-A8C5-ECC9F3942E4B}">
+                <a14:imgProps xmlns:a14="http://schemas.microsoft.com/office/drawing/2010/main">
+                  <a14:imgLayer r:embed="rId9">
+                    <a14:imgEffect>
+                      <a14:brightnessContrast bright="100000"/>
+                    </a14:imgEffect>
+                  </a14:imgLayer>
+                </a14:imgProps>
+              </a:ext>
+              <a:ext uri="{28A0092B-C50C-407E-A947-70E740481C1C}">
+                <a14:useLocalDpi xmlns:a14="http://schemas.microsoft.com/office/drawing/2010/main" val="0"/>
+              </a:ext>
+            </a:extLst>
+          </a:blip>
+          <a:srcRect/>
+          <a:stretch>
+            <a:fillRect/>
+          </a:stretch>
+        </p:blipFill>
+        <p:spPr bwMode="auto">
+          <a:xfrm>
+            <a:off x="468861" y="1140781"/>
+            <a:ext cx="391731" cy="391731"/>
+          </a:xfrm>
+          <a:prstGeom prst="rect">
+            <a:avLst/>
+          </a:prstGeom>
+          <a:noFill/>
+          <a:extLst>
+            <a:ext uri="{909E8E84-426E-40DD-AFC4-6F175D3DCCD1}">
+              <a14:hiddenFill xmlns:a14="http://schemas.microsoft.com/office/drawing/2010/main">
+                <a:solidFill>
+                  <a:srgbClr val="FFFFFF"/>
+                </a:solidFill>
+              </a14:hiddenFill>
+            </a:ext>
+          </a:extLst>
+        </p:spPr>
+      </p:pic>
     </p:spTree>
     <p:extLst>
       <p:ext uri="{BB962C8B-B14F-4D97-AF65-F5344CB8AC3E}">
-        <p14:creationId xmlns:p14="http://schemas.microsoft.com/office/powerpoint/2010/main" val="2220848827"/>
+        <p14:creationId xmlns:p14="http://schemas.microsoft.com/office/powerpoint/2010/main" val="1415170205"/>
+      </p:ext>
+    </p:extLst>
+  </p:cSld>
+  <p:clrMapOvr>
+    <a:masterClrMapping/>
+  </p:clrMapOvr>
+</p:sld>
+</file>
+
+<file path=ppt/slides/slide3.xml><?xml version="1.0" encoding="utf-8"?>
+<p:sld xmlns:a="http://schemas.openxmlformats.org/drawingml/2006/main" xmlns:r="http://schemas.openxmlformats.org/officeDocument/2006/relationships" xmlns:p="http://schemas.openxmlformats.org/presentationml/2006/main">
+  <p:cSld>
+    <p:spTree>
+      <p:nvGrpSpPr>
+        <p:cNvPr id="1" name=""/>
+        <p:cNvGrpSpPr/>
+        <p:nvPr/>
+      </p:nvGrpSpPr>
+      <p:grpSpPr>
+        <a:xfrm>
+          <a:off x="0" y="0"/>
+          <a:ext cx="0" cy="0"/>
+          <a:chOff x="0" y="0"/>
+          <a:chExt cx="0" cy="0"/>
+        </a:xfrm>
+      </p:grpSpPr>
+      <p:sp>
+        <p:nvSpPr>
+          <p:cNvPr id="38" name="CuadroTexto 37">
+            <a:extLst>
+              <a:ext uri="{FF2B5EF4-FFF2-40B4-BE49-F238E27FC236}">
+                <a16:creationId xmlns:a16="http://schemas.microsoft.com/office/drawing/2014/main" id="{B5D521F6-23BD-8409-EA1B-3BC0445B0C55}"/>
+              </a:ext>
+            </a:extLst>
+          </p:cNvPr>
+          <p:cNvSpPr txBox="1"/>
+          <p:nvPr/>
+        </p:nvSpPr>
+        <p:spPr>
+          <a:xfrm>
+            <a:off x="230282" y="955984"/>
+            <a:ext cx="11595949" cy="1815882"/>
+          </a:xfrm>
+          <a:prstGeom prst="rect">
+            <a:avLst/>
+          </a:prstGeom>
+          <a:noFill/>
+        </p:spPr>
+        <p:txBody>
+          <a:bodyPr wrap="square" rtlCol="0">
+            <a:spAutoFit/>
+          </a:bodyPr>
+          <a:lstStyle/>
+          <a:p>
+            <a:r>
+              <a:rPr lang="en-GB" sz="1400" dirty="0">
+                <a:solidFill>
+                  <a:schemeClr val="bg1"/>
+                </a:solidFill>
+              </a:rPr>
+              <a:t>Tidio is a ticketing tool for customer service. When an incidence occurs, an user opens a ticket that Will be handled by an agent.</a:t>
+            </a:r>
+          </a:p>
+          <a:p>
+            <a:endParaRPr lang="en-GB" sz="1400" dirty="0">
+              <a:solidFill>
+                <a:schemeClr val="bg1"/>
+              </a:solidFill>
+            </a:endParaRPr>
+          </a:p>
+          <a:p>
+            <a:r>
+              <a:rPr lang="en-GB" sz="1400" b="1" dirty="0">
+                <a:solidFill>
+                  <a:schemeClr val="bg1"/>
+                </a:solidFill>
+              </a:rPr>
+              <a:t>Used by</a:t>
+            </a:r>
+          </a:p>
+          <a:p>
+            <a:pPr marL="285750" indent="-285750">
+              <a:buFont typeface="Arial" panose="020B0604020202020204" pitchFamily="34" charset="0"/>
+              <a:buChar char="•"/>
+            </a:pPr>
+            <a:r>
+              <a:rPr lang="en-GB" sz="1400" dirty="0">
+                <a:solidFill>
+                  <a:schemeClr val="bg1"/>
+                </a:solidFill>
+              </a:rPr>
+              <a:t>La Botiga Market</a:t>
+            </a:r>
+          </a:p>
+          <a:p>
+            <a:pPr marL="285750" indent="-285750">
+              <a:buFont typeface="Arial" panose="020B0604020202020204" pitchFamily="34" charset="0"/>
+              <a:buChar char="•"/>
+            </a:pPr>
+            <a:r>
+              <a:rPr lang="en-GB" sz="1400" dirty="0">
+                <a:solidFill>
+                  <a:schemeClr val="bg1"/>
+                </a:solidFill>
+              </a:rPr>
+              <a:t>MIM Spare</a:t>
+            </a:r>
+          </a:p>
+          <a:p>
+            <a:pPr marL="285750" indent="-285750">
+              <a:buFont typeface="Arial" panose="020B0604020202020204" pitchFamily="34" charset="0"/>
+              <a:buChar char="•"/>
+            </a:pPr>
+            <a:endParaRPr lang="en-GB" sz="1400" dirty="0">
+              <a:solidFill>
+                <a:schemeClr val="bg1"/>
+              </a:solidFill>
+            </a:endParaRPr>
+          </a:p>
+          <a:p>
+            <a:r>
+              <a:rPr lang="en-GB" sz="1400" b="1" dirty="0">
+                <a:solidFill>
+                  <a:schemeClr val="bg1"/>
+                </a:solidFill>
+              </a:rPr>
+              <a:t>Main accounts</a:t>
+            </a:r>
+          </a:p>
+          <a:p>
+            <a:pPr marL="285750" indent="-285750">
+              <a:buFont typeface="Arial" panose="020B0604020202020204" pitchFamily="34" charset="0"/>
+              <a:buChar char="•"/>
+            </a:pPr>
+            <a:r>
+              <a:rPr lang="en-GB" sz="1400" dirty="0">
+                <a:solidFill>
+                  <a:schemeClr val="bg1"/>
+                </a:solidFill>
+              </a:rPr>
+              <a:t>admin@businessnamedomain</a:t>
+            </a:r>
+          </a:p>
+        </p:txBody>
+      </p:sp>
+      <p:sp>
+        <p:nvSpPr>
+          <p:cNvPr id="2" name="CuadroTexto 1">
+            <a:extLst>
+              <a:ext uri="{FF2B5EF4-FFF2-40B4-BE49-F238E27FC236}">
+                <a16:creationId xmlns:a16="http://schemas.microsoft.com/office/drawing/2014/main" id="{BAEA0D98-05E4-E10D-EB44-AD566BE7CA96}"/>
+              </a:ext>
+            </a:extLst>
+          </p:cNvPr>
+          <p:cNvSpPr txBox="1"/>
+          <p:nvPr/>
+        </p:nvSpPr>
+        <p:spPr>
+          <a:xfrm>
+            <a:off x="1272778" y="271692"/>
+            <a:ext cx="7227565" cy="369332"/>
+          </a:xfrm>
+          <a:prstGeom prst="rect">
+            <a:avLst/>
+          </a:prstGeom>
+          <a:noFill/>
+        </p:spPr>
+        <p:txBody>
+          <a:bodyPr wrap="square" rtlCol="0">
+            <a:spAutoFit/>
+          </a:bodyPr>
+          <a:lstStyle/>
+          <a:p>
+            <a:r>
+              <a:rPr lang="es-ES" b="1" dirty="0">
+                <a:solidFill>
+                  <a:schemeClr val="bg1"/>
+                </a:solidFill>
+              </a:rPr>
+              <a:t>Tidio</a:t>
+            </a:r>
+          </a:p>
+        </p:txBody>
+      </p:sp>
+      <p:sp>
+        <p:nvSpPr>
+          <p:cNvPr id="3" name="CuadroTexto 2">
+            <a:extLst>
+              <a:ext uri="{FF2B5EF4-FFF2-40B4-BE49-F238E27FC236}">
+                <a16:creationId xmlns:a16="http://schemas.microsoft.com/office/drawing/2014/main" id="{DC563E51-BCA8-57FB-C8E8-C22BB50E317E}"/>
+              </a:ext>
+            </a:extLst>
+          </p:cNvPr>
+          <p:cNvSpPr txBox="1"/>
+          <p:nvPr/>
+        </p:nvSpPr>
+        <p:spPr>
+          <a:xfrm>
+            <a:off x="230283" y="271692"/>
+            <a:ext cx="856837" cy="369332"/>
+          </a:xfrm>
+          <a:prstGeom prst="rect">
+            <a:avLst/>
+          </a:prstGeom>
+          <a:noFill/>
+        </p:spPr>
+        <p:txBody>
+          <a:bodyPr wrap="square" rtlCol="0">
+            <a:spAutoFit/>
+          </a:bodyPr>
+          <a:lstStyle/>
+          <a:p>
+            <a:r>
+              <a:rPr lang="es-ES" b="1" dirty="0">
+                <a:solidFill>
+                  <a:schemeClr val="bg1"/>
+                </a:solidFill>
+              </a:rPr>
+              <a:t>Apps</a:t>
+            </a:r>
+          </a:p>
+        </p:txBody>
+      </p:sp>
+      <p:cxnSp>
+        <p:nvCxnSpPr>
+          <p:cNvPr id="5" name="Conector recto 4">
+            <a:extLst>
+              <a:ext uri="{FF2B5EF4-FFF2-40B4-BE49-F238E27FC236}">
+                <a16:creationId xmlns:a16="http://schemas.microsoft.com/office/drawing/2014/main" id="{FB6C8116-AB68-B8C0-A9B3-12B97A3CCB9F}"/>
+              </a:ext>
+            </a:extLst>
+          </p:cNvPr>
+          <p:cNvCxnSpPr/>
+          <p:nvPr/>
+        </p:nvCxnSpPr>
+        <p:spPr>
+          <a:xfrm>
+            <a:off x="924560" y="271692"/>
+            <a:ext cx="0" cy="369332"/>
+          </a:xfrm>
+          <a:prstGeom prst="line">
+            <a:avLst/>
+          </a:prstGeom>
+          <a:ln w="38100">
+            <a:solidFill>
+              <a:srgbClr val="CC99FF"/>
+            </a:solidFill>
+          </a:ln>
+        </p:spPr>
+        <p:style>
+          <a:lnRef idx="1">
+            <a:schemeClr val="accent1"/>
+          </a:lnRef>
+          <a:fillRef idx="0">
+            <a:schemeClr val="accent1"/>
+          </a:fillRef>
+          <a:effectRef idx="0">
+            <a:schemeClr val="accent1"/>
+          </a:effectRef>
+          <a:fontRef idx="minor">
+            <a:schemeClr val="tx1"/>
+          </a:fontRef>
+        </p:style>
+      </p:cxnSp>
+    </p:spTree>
+    <p:extLst>
+      <p:ext uri="{BB962C8B-B14F-4D97-AF65-F5344CB8AC3E}">
+        <p14:creationId xmlns:p14="http://schemas.microsoft.com/office/powerpoint/2010/main" val="2657230352"/>
+      </p:ext>
+    </p:extLst>
+  </p:cSld>
+  <p:clrMapOvr>
+    <a:masterClrMapping/>
+  </p:clrMapOvr>
+</p:sld>
+</file>
+
+<file path=ppt/slides/slide4.xml><?xml version="1.0" encoding="utf-8"?>
+<p:sld xmlns:a="http://schemas.openxmlformats.org/drawingml/2006/main" xmlns:r="http://schemas.openxmlformats.org/officeDocument/2006/relationships" xmlns:p="http://schemas.openxmlformats.org/presentationml/2006/main">
+  <p:cSld>
+    <p:spTree>
+      <p:nvGrpSpPr>
+        <p:cNvPr id="1" name=""/>
+        <p:cNvGrpSpPr/>
+        <p:nvPr/>
+      </p:nvGrpSpPr>
+      <p:grpSpPr>
+        <a:xfrm>
+          <a:off x="0" y="0"/>
+          <a:ext cx="0" cy="0"/>
+          <a:chOff x="0" y="0"/>
+          <a:chExt cx="0" cy="0"/>
+        </a:xfrm>
+      </p:grpSpPr>
+      <p:sp>
+        <p:nvSpPr>
+          <p:cNvPr id="2" name="CuadroTexto 1">
+            <a:extLst>
+              <a:ext uri="{FF2B5EF4-FFF2-40B4-BE49-F238E27FC236}">
+                <a16:creationId xmlns:a16="http://schemas.microsoft.com/office/drawing/2014/main" id="{BAEA0D98-05E4-E10D-EB44-AD566BE7CA96}"/>
+              </a:ext>
+            </a:extLst>
+          </p:cNvPr>
+          <p:cNvSpPr txBox="1"/>
+          <p:nvPr/>
+        </p:nvSpPr>
+        <p:spPr>
+          <a:xfrm>
+            <a:off x="1272778" y="271692"/>
+            <a:ext cx="7227565" cy="369332"/>
+          </a:xfrm>
+          <a:prstGeom prst="rect">
+            <a:avLst/>
+          </a:prstGeom>
+          <a:noFill/>
+        </p:spPr>
+        <p:txBody>
+          <a:bodyPr wrap="square" rtlCol="0">
+            <a:spAutoFit/>
+          </a:bodyPr>
+          <a:lstStyle/>
+          <a:p>
+            <a:r>
+              <a:rPr lang="es-ES" b="1" dirty="0">
+                <a:solidFill>
+                  <a:schemeClr val="bg1"/>
+                </a:solidFill>
+              </a:rPr>
+              <a:t>Sendcloud</a:t>
+            </a:r>
+          </a:p>
+        </p:txBody>
+      </p:sp>
+      <p:sp>
+        <p:nvSpPr>
+          <p:cNvPr id="3" name="CuadroTexto 2">
+            <a:extLst>
+              <a:ext uri="{FF2B5EF4-FFF2-40B4-BE49-F238E27FC236}">
+                <a16:creationId xmlns:a16="http://schemas.microsoft.com/office/drawing/2014/main" id="{DC563E51-BCA8-57FB-C8E8-C22BB50E317E}"/>
+              </a:ext>
+            </a:extLst>
+          </p:cNvPr>
+          <p:cNvSpPr txBox="1"/>
+          <p:nvPr/>
+        </p:nvSpPr>
+        <p:spPr>
+          <a:xfrm>
+            <a:off x="230283" y="271692"/>
+            <a:ext cx="856837" cy="369332"/>
+          </a:xfrm>
+          <a:prstGeom prst="rect">
+            <a:avLst/>
+          </a:prstGeom>
+          <a:noFill/>
+        </p:spPr>
+        <p:txBody>
+          <a:bodyPr wrap="square" rtlCol="0">
+            <a:spAutoFit/>
+          </a:bodyPr>
+          <a:lstStyle/>
+          <a:p>
+            <a:r>
+              <a:rPr lang="es-ES" b="1" dirty="0">
+                <a:solidFill>
+                  <a:schemeClr val="bg1"/>
+                </a:solidFill>
+              </a:rPr>
+              <a:t>Apps</a:t>
+            </a:r>
+          </a:p>
+        </p:txBody>
+      </p:sp>
+      <p:cxnSp>
+        <p:nvCxnSpPr>
+          <p:cNvPr id="5" name="Conector recto 4">
+            <a:extLst>
+              <a:ext uri="{FF2B5EF4-FFF2-40B4-BE49-F238E27FC236}">
+                <a16:creationId xmlns:a16="http://schemas.microsoft.com/office/drawing/2014/main" id="{FB6C8116-AB68-B8C0-A9B3-12B97A3CCB9F}"/>
+              </a:ext>
+            </a:extLst>
+          </p:cNvPr>
+          <p:cNvCxnSpPr/>
+          <p:nvPr/>
+        </p:nvCxnSpPr>
+        <p:spPr>
+          <a:xfrm>
+            <a:off x="924560" y="271692"/>
+            <a:ext cx="0" cy="369332"/>
+          </a:xfrm>
+          <a:prstGeom prst="line">
+            <a:avLst/>
+          </a:prstGeom>
+          <a:ln w="38100">
+            <a:solidFill>
+              <a:srgbClr val="CC99FF"/>
+            </a:solidFill>
+          </a:ln>
+        </p:spPr>
+        <p:style>
+          <a:lnRef idx="1">
+            <a:schemeClr val="accent1"/>
+          </a:lnRef>
+          <a:fillRef idx="0">
+            <a:schemeClr val="accent1"/>
+          </a:fillRef>
+          <a:effectRef idx="0">
+            <a:schemeClr val="accent1"/>
+          </a:effectRef>
+          <a:fontRef idx="minor">
+            <a:schemeClr val="tx1"/>
+          </a:fontRef>
+        </p:style>
+      </p:cxnSp>
+    </p:spTree>
+    <p:extLst>
+      <p:ext uri="{BB962C8B-B14F-4D97-AF65-F5344CB8AC3E}">
+        <p14:creationId xmlns:p14="http://schemas.microsoft.com/office/powerpoint/2010/main" val="1164405474"/>
+      </p:ext>
+    </p:extLst>
+  </p:cSld>
+  <p:clrMapOvr>
+    <a:masterClrMapping/>
+  </p:clrMapOvr>
+</p:sld>
+</file>
+
+<file path=ppt/slides/slide5.xml><?xml version="1.0" encoding="utf-8"?>
+<p:sld xmlns:a="http://schemas.openxmlformats.org/drawingml/2006/main" xmlns:r="http://schemas.openxmlformats.org/officeDocument/2006/relationships" xmlns:p="http://schemas.openxmlformats.org/presentationml/2006/main">
+  <p:cSld>
+    <p:spTree>
+      <p:nvGrpSpPr>
+        <p:cNvPr id="1" name=""/>
+        <p:cNvGrpSpPr/>
+        <p:nvPr/>
+      </p:nvGrpSpPr>
+      <p:grpSpPr>
+        <a:xfrm>
+          <a:off x="0" y="0"/>
+          <a:ext cx="0" cy="0"/>
+          <a:chOff x="0" y="0"/>
+          <a:chExt cx="0" cy="0"/>
+        </a:xfrm>
+      </p:grpSpPr>
+      <p:sp>
+        <p:nvSpPr>
+          <p:cNvPr id="2" name="CuadroTexto 1">
+            <a:extLst>
+              <a:ext uri="{FF2B5EF4-FFF2-40B4-BE49-F238E27FC236}">
+                <a16:creationId xmlns:a16="http://schemas.microsoft.com/office/drawing/2014/main" id="{BAEA0D98-05E4-E10D-EB44-AD566BE7CA96}"/>
+              </a:ext>
+            </a:extLst>
+          </p:cNvPr>
+          <p:cNvSpPr txBox="1"/>
+          <p:nvPr/>
+        </p:nvSpPr>
+        <p:spPr>
+          <a:xfrm>
+            <a:off x="1272778" y="271692"/>
+            <a:ext cx="7227565" cy="369332"/>
+          </a:xfrm>
+          <a:prstGeom prst="rect">
+            <a:avLst/>
+          </a:prstGeom>
+          <a:noFill/>
+        </p:spPr>
+        <p:txBody>
+          <a:bodyPr wrap="square" rtlCol="0">
+            <a:spAutoFit/>
+          </a:bodyPr>
+          <a:lstStyle/>
+          <a:p>
+            <a:r>
+              <a:rPr lang="es-ES" b="1" dirty="0">
+                <a:solidFill>
+                  <a:schemeClr val="bg1"/>
+                </a:solidFill>
+              </a:rPr>
+              <a:t>Definition</a:t>
+            </a:r>
+          </a:p>
+        </p:txBody>
+      </p:sp>
+      <p:sp>
+        <p:nvSpPr>
+          <p:cNvPr id="3" name="CuadroTexto 2">
+            <a:extLst>
+              <a:ext uri="{FF2B5EF4-FFF2-40B4-BE49-F238E27FC236}">
+                <a16:creationId xmlns:a16="http://schemas.microsoft.com/office/drawing/2014/main" id="{DC563E51-BCA8-57FB-C8E8-C22BB50E317E}"/>
+              </a:ext>
+            </a:extLst>
+          </p:cNvPr>
+          <p:cNvSpPr txBox="1"/>
+          <p:nvPr/>
+        </p:nvSpPr>
+        <p:spPr>
+          <a:xfrm>
+            <a:off x="230283" y="271692"/>
+            <a:ext cx="856837" cy="369332"/>
+          </a:xfrm>
+          <a:prstGeom prst="rect">
+            <a:avLst/>
+          </a:prstGeom>
+          <a:noFill/>
+        </p:spPr>
+        <p:txBody>
+          <a:bodyPr wrap="square" rtlCol="0">
+            <a:spAutoFit/>
+          </a:bodyPr>
+          <a:lstStyle/>
+          <a:p>
+            <a:r>
+              <a:rPr lang="es-ES" b="1" dirty="0">
+                <a:solidFill>
+                  <a:schemeClr val="bg1"/>
+                </a:solidFill>
+              </a:rPr>
+              <a:t>APIs</a:t>
+            </a:r>
+          </a:p>
+        </p:txBody>
+      </p:sp>
+      <p:cxnSp>
+        <p:nvCxnSpPr>
+          <p:cNvPr id="5" name="Conector recto 4">
+            <a:extLst>
+              <a:ext uri="{FF2B5EF4-FFF2-40B4-BE49-F238E27FC236}">
+                <a16:creationId xmlns:a16="http://schemas.microsoft.com/office/drawing/2014/main" id="{FB6C8116-AB68-B8C0-A9B3-12B97A3CCB9F}"/>
+              </a:ext>
+            </a:extLst>
+          </p:cNvPr>
+          <p:cNvCxnSpPr/>
+          <p:nvPr/>
+        </p:nvCxnSpPr>
+        <p:spPr>
+          <a:xfrm>
+            <a:off x="924560" y="271692"/>
+            <a:ext cx="0" cy="369332"/>
+          </a:xfrm>
+          <a:prstGeom prst="line">
+            <a:avLst/>
+          </a:prstGeom>
+          <a:ln w="38100">
+            <a:solidFill>
+              <a:srgbClr val="CC99FF"/>
+            </a:solidFill>
+          </a:ln>
+        </p:spPr>
+        <p:style>
+          <a:lnRef idx="1">
+            <a:schemeClr val="accent1"/>
+          </a:lnRef>
+          <a:fillRef idx="0">
+            <a:schemeClr val="accent1"/>
+          </a:fillRef>
+          <a:effectRef idx="0">
+            <a:schemeClr val="accent1"/>
+          </a:effectRef>
+          <a:fontRef idx="minor">
+            <a:schemeClr val="tx1"/>
+          </a:fontRef>
+        </p:style>
+      </p:cxnSp>
+    </p:spTree>
+    <p:extLst>
+      <p:ext uri="{BB962C8B-B14F-4D97-AF65-F5344CB8AC3E}">
+        <p14:creationId xmlns:p14="http://schemas.microsoft.com/office/powerpoint/2010/main" val="1532190925"/>
       </p:ext>
     </p:extLst>
   </p:cSld>

</xml_diff>